<commit_message>
Minor cosmetic changes to presentation
</commit_message>
<xml_diff>
--- a/MidPresentation_Andy_Or.pptx
+++ b/MidPresentation_Andy_Or.pptx
@@ -5,10 +5,10 @@
     <p:sldMasterId id="2147483708" r:id="rId1"/>
   </p:sldMasterIdLst>
   <p:notesMasterIdLst>
-    <p:notesMasterId r:id="rId27"/>
+    <p:notesMasterId r:id="rId28"/>
   </p:notesMasterIdLst>
   <p:handoutMasterIdLst>
-    <p:handoutMasterId r:id="rId28"/>
+    <p:handoutMasterId r:id="rId29"/>
   </p:handoutMasterIdLst>
   <p:sldIdLst>
     <p:sldId id="288" r:id="rId2"/>
@@ -27,15 +27,16 @@
     <p:sldId id="311" r:id="rId15"/>
     <p:sldId id="302" r:id="rId16"/>
     <p:sldId id="313" r:id="rId17"/>
-    <p:sldId id="314" r:id="rId18"/>
-    <p:sldId id="316" r:id="rId19"/>
-    <p:sldId id="293" r:id="rId20"/>
-    <p:sldId id="307" r:id="rId21"/>
-    <p:sldId id="308" r:id="rId22"/>
-    <p:sldId id="295" r:id="rId23"/>
-    <p:sldId id="296" r:id="rId24"/>
-    <p:sldId id="299" r:id="rId25"/>
-    <p:sldId id="298" r:id="rId26"/>
+    <p:sldId id="317" r:id="rId18"/>
+    <p:sldId id="314" r:id="rId19"/>
+    <p:sldId id="316" r:id="rId20"/>
+    <p:sldId id="293" r:id="rId21"/>
+    <p:sldId id="307" r:id="rId22"/>
+    <p:sldId id="308" r:id="rId23"/>
+    <p:sldId id="295" r:id="rId24"/>
+    <p:sldId id="296" r:id="rId25"/>
+    <p:sldId id="299" r:id="rId26"/>
+    <p:sldId id="298" r:id="rId27"/>
   </p:sldIdLst>
   <p:sldSz cx="9144000" cy="6858000" type="screen4x3"/>
   <p:notesSz cx="7010400" cy="9296400"/>
@@ -165,20 +166,6 @@
 </p:cmAuthorLst>
 </file>
 
-<file path=ppt/comments/comment1.xml><?xml version="1.0" encoding="utf-8"?>
-<p:cmLst xmlns:a="http://schemas.openxmlformats.org/drawingml/2006/main" xmlns:r="http://schemas.openxmlformats.org/officeDocument/2006/relationships" xmlns:p="http://schemas.openxmlformats.org/presentationml/2006/main">
-  <p:cm authorId="1" dt="2016-08-31T15:07:40.279" idx="2">
-    <p:pos x="10" y="10"/>
-    <p:text>In these slides don't forget to give references to previous works, for example: [Cohen &amp; Levi, 2010] or [Cohen et al, 2013]</p:text>
-    <p:extLst>
-      <p:ext uri="{C676402C-5697-4E1C-873F-D02D1690AC5C}">
-        <p15:threadingInfo xmlns:p15="http://schemas.microsoft.com/office/powerpoint/2012/main" timeZoneBias="-180"/>
-      </p:ext>
-    </p:extLst>
-  </p:cm>
-</p:cmLst>
-</file>
-
 <file path=ppt/handoutMasters/handoutMaster1.xml><?xml version="1.0" encoding="utf-8"?>
 <p:handoutMaster xmlns:a="http://schemas.openxmlformats.org/drawingml/2006/main" xmlns:r="http://schemas.openxmlformats.org/officeDocument/2006/relationships" xmlns:p="http://schemas.openxmlformats.org/presentationml/2006/main">
   <p:cSld>
@@ -262,7 +249,7 @@
             <a:fld id="{C9B6F397-9295-4C9F-B4B0-31BF9D08FE68}" type="datetimeFigureOut">
               <a:rPr lang="he-IL" smtClean="0"/>
               <a:pPr/>
-              <a:t>ט'/טבת/תש"פ</a:t>
+              <a:t>י'/טבת/תש"פ</a:t>
             </a:fld>
             <a:endParaRPr lang="he-IL"/>
           </a:p>
@@ -433,7 +420,7 @@
             <a:fld id="{543B7BDA-9DDC-4E4C-973D-E4A3E66645CD}" type="datetimeFigureOut">
               <a:rPr lang="he-IL" smtClean="0"/>
               <a:pPr/>
-              <a:t>ט'/טבת/תש"פ</a:t>
+              <a:t>י'/טבת/תש"פ</a:t>
             </a:fld>
             <a:endParaRPr lang="he-IL"/>
           </a:p>
@@ -865,11 +852,29 @@
           <a:p>
             <a:r>
               <a:rPr lang="he-IL" dirty="0"/>
-              <a:t>להסביר מה זה </a:t>
+              <a:t>הפעלת </a:t>
             </a:r>
             <a:r>
               <a:rPr lang="en-US" dirty="0"/>
-              <a:t>COCO DETECTION CHALLENGE</a:t>
+              <a:t>DCN</a:t>
+            </a:r>
+            <a:r>
+              <a:rPr lang="he-IL" dirty="0"/>
+              <a:t> על מספר השכבות האחרונות, השוואת תוצאות</a:t>
+            </a:r>
+          </a:p>
+          <a:p>
+            <a:r>
+              <a:rPr lang="en-US" dirty="0" err="1"/>
+              <a:t>mAP,mIoU</a:t>
+            </a:r>
+            <a:r>
+              <a:rPr lang="he-IL" dirty="0"/>
+              <a:t> – שיטות ניקוד שונות עבור זיהוי </a:t>
+            </a:r>
+            <a:r>
+              <a:rPr lang="en-US" dirty="0"/>
+              <a:t>REGIONS</a:t>
             </a:r>
           </a:p>
         </p:txBody>
@@ -892,7 +897,7 @@
             <a:fld id="{C8C92D0D-AF30-4211-86C4-A3B87597F349}" type="slidenum">
               <a:rPr lang="he-IL" smtClean="0"/>
               <a:pPr/>
-              <a:t>15</a:t>
+              <a:t>14</a:t>
             </a:fld>
             <a:endParaRPr lang="he-IL"/>
           </a:p>
@@ -929,7 +934,7 @@
     </p:spTree>
     <p:extLst>
       <p:ext uri="{BB962C8B-B14F-4D97-AF65-F5344CB8AC3E}">
-        <p14:creationId xmlns:p14="http://schemas.microsoft.com/office/powerpoint/2010/main" val="3966368392"/>
+        <p14:creationId xmlns:p14="http://schemas.microsoft.com/office/powerpoint/2010/main" val="4269872321"/>
       </p:ext>
     </p:extLst>
   </p:cSld>
@@ -983,6 +988,30 @@
           <a:bodyPr/>
           <a:lstStyle/>
           <a:p>
+            <a:r>
+              <a:rPr lang="he-IL" dirty="0"/>
+              <a:t>להסביר מה זה </a:t>
+            </a:r>
+            <a:r>
+              <a:rPr lang="en-US" dirty="0"/>
+              <a:t>COCO DETECTION CHALLENGE</a:t>
+            </a:r>
+            <a:r>
+              <a:rPr lang="he-IL" dirty="0"/>
+              <a:t>:</a:t>
+            </a:r>
+          </a:p>
+          <a:p>
+            <a:r>
+              <a:rPr lang="en-US" dirty="0"/>
+              <a:t>Common Objects in Context</a:t>
+            </a:r>
+          </a:p>
+          <a:p>
+            <a:r>
+              <a:rPr lang="he-IL" dirty="0"/>
+              <a:t>זה  דאטה סט שמכיל מעלה מ300,000 תמונות, מתוכן בערך 200,000 מתויגות. המטרה – זיהוי עצמים (למעלה מ100 תגיות שונות)</a:t>
+            </a:r>
             <a:endParaRPr lang="en-US" dirty="0"/>
           </a:p>
         </p:txBody>
@@ -1005,7 +1034,7 @@
             <a:fld id="{C8C92D0D-AF30-4211-86C4-A3B87597F349}" type="slidenum">
               <a:rPr lang="he-IL" smtClean="0"/>
               <a:pPr/>
-              <a:t>16</a:t>
+              <a:t>15</a:t>
             </a:fld>
             <a:endParaRPr lang="he-IL"/>
           </a:p>
@@ -1042,7 +1071,7 @@
     </p:spTree>
     <p:extLst>
       <p:ext uri="{BB962C8B-B14F-4D97-AF65-F5344CB8AC3E}">
-        <p14:creationId xmlns:p14="http://schemas.microsoft.com/office/powerpoint/2010/main" val="2969221266"/>
+        <p14:creationId xmlns:p14="http://schemas.microsoft.com/office/powerpoint/2010/main" val="3966368392"/>
       </p:ext>
     </p:extLst>
   </p:cSld>
@@ -1118,7 +1147,7 @@
             <a:fld id="{C8C92D0D-AF30-4211-86C4-A3B87597F349}" type="slidenum">
               <a:rPr lang="he-IL" smtClean="0"/>
               <a:pPr/>
-              <a:t>17</a:t>
+              <a:t>16</a:t>
             </a:fld>
             <a:endParaRPr lang="he-IL"/>
           </a:p>
@@ -1155,7 +1184,7 @@
     </p:spTree>
     <p:extLst>
       <p:ext uri="{BB962C8B-B14F-4D97-AF65-F5344CB8AC3E}">
-        <p14:creationId xmlns:p14="http://schemas.microsoft.com/office/powerpoint/2010/main" val="1491496478"/>
+        <p14:creationId xmlns:p14="http://schemas.microsoft.com/office/powerpoint/2010/main" val="2969221266"/>
       </p:ext>
     </p:extLst>
   </p:cSld>
@@ -1231,7 +1260,7 @@
             <a:fld id="{C8C92D0D-AF30-4211-86C4-A3B87597F349}" type="slidenum">
               <a:rPr lang="he-IL" smtClean="0"/>
               <a:pPr/>
-              <a:t>18</a:t>
+              <a:t>17</a:t>
             </a:fld>
             <a:endParaRPr lang="he-IL"/>
           </a:p>
@@ -1268,7 +1297,7 @@
     </p:spTree>
     <p:extLst>
       <p:ext uri="{BB962C8B-B14F-4D97-AF65-F5344CB8AC3E}">
-        <p14:creationId xmlns:p14="http://schemas.microsoft.com/office/powerpoint/2010/main" val="3047872805"/>
+        <p14:creationId xmlns:p14="http://schemas.microsoft.com/office/powerpoint/2010/main" val="2491454129"/>
       </p:ext>
     </p:extLst>
   </p:cSld>
@@ -1322,13 +1351,6 @@
           <a:bodyPr/>
           <a:lstStyle/>
           <a:p>
-            <a:r>
-              <a:rPr lang="he-IL" dirty="0"/>
-              <a:t>אולי להרחיב במעט על הרשתות הידועות ומדוע בחרנו בהן</a:t>
-            </a:r>
-            <a:endParaRPr lang="en-US" dirty="0"/>
-          </a:p>
-          <a:p>
             <a:endParaRPr lang="en-US" dirty="0"/>
           </a:p>
         </p:txBody>
@@ -1351,7 +1373,7 @@
             <a:fld id="{C8C92D0D-AF30-4211-86C4-A3B87597F349}" type="slidenum">
               <a:rPr lang="he-IL" smtClean="0"/>
               <a:pPr/>
-              <a:t>19</a:t>
+              <a:t>18</a:t>
             </a:fld>
             <a:endParaRPr lang="he-IL"/>
           </a:p>
@@ -1362,7 +1384,7 @@
           <p:cNvPr id="5" name="Footer Placeholder 4">
             <a:extLst>
               <a:ext uri="{FF2B5EF4-FFF2-40B4-BE49-F238E27FC236}">
-                <a16:creationId xmlns:a16="http://schemas.microsoft.com/office/drawing/2014/main" id="{65C03B0E-2E4A-4E8D-89B2-0DF2F71549EE}"/>
+                <a16:creationId xmlns:a16="http://schemas.microsoft.com/office/drawing/2014/main" id="{AD753467-F10B-4164-AC16-609227753711}"/>
               </a:ext>
             </a:extLst>
           </p:cNvPr>
@@ -1388,7 +1410,7 @@
     </p:spTree>
     <p:extLst>
       <p:ext uri="{BB962C8B-B14F-4D97-AF65-F5344CB8AC3E}">
-        <p14:creationId xmlns:p14="http://schemas.microsoft.com/office/powerpoint/2010/main" val="1306353171"/>
+        <p14:creationId xmlns:p14="http://schemas.microsoft.com/office/powerpoint/2010/main" val="1491496478"/>
       </p:ext>
     </p:extLst>
   </p:cSld>
@@ -1442,14 +1464,7 @@
           <a:bodyPr/>
           <a:lstStyle/>
           <a:p>
-            <a:r>
-              <a:rPr lang="he-IL" dirty="0"/>
-              <a:t>להסביר שעל השכבות המדוברות נרצה ליישם </a:t>
-            </a:r>
-            <a:r>
-              <a:rPr lang="en-US" dirty="0"/>
-              <a:t>DCN</a:t>
-            </a:r>
+            <a:endParaRPr lang="en-US" dirty="0"/>
           </a:p>
         </p:txBody>
       </p:sp>
@@ -1471,7 +1486,7 @@
             <a:fld id="{C8C92D0D-AF30-4211-86C4-A3B87597F349}" type="slidenum">
               <a:rPr lang="he-IL" smtClean="0"/>
               <a:pPr/>
-              <a:t>20</a:t>
+              <a:t>19</a:t>
             </a:fld>
             <a:endParaRPr lang="he-IL"/>
           </a:p>
@@ -1482,7 +1497,7 @@
           <p:cNvPr id="5" name="Footer Placeholder 4">
             <a:extLst>
               <a:ext uri="{FF2B5EF4-FFF2-40B4-BE49-F238E27FC236}">
-                <a16:creationId xmlns:a16="http://schemas.microsoft.com/office/drawing/2014/main" id="{EAB95C90-7FCD-4A76-85DB-E96F4FA14E41}"/>
+                <a16:creationId xmlns:a16="http://schemas.microsoft.com/office/drawing/2014/main" id="{AD753467-F10B-4164-AC16-609227753711}"/>
               </a:ext>
             </a:extLst>
           </p:cNvPr>
@@ -1508,7 +1523,7 @@
     </p:spTree>
     <p:extLst>
       <p:ext uri="{BB962C8B-B14F-4D97-AF65-F5344CB8AC3E}">
-        <p14:creationId xmlns:p14="http://schemas.microsoft.com/office/powerpoint/2010/main" val="1289365257"/>
+        <p14:creationId xmlns:p14="http://schemas.microsoft.com/office/powerpoint/2010/main" val="3047872805"/>
       </p:ext>
     </p:extLst>
   </p:cSld>
@@ -1562,61 +1577,13 @@
           <a:bodyPr/>
           <a:lstStyle/>
           <a:p>
-            <a:pPr marL="0" marR="0" lvl="0" indent="0" algn="r" defTabSz="914400" rtl="1" eaLnBrk="1" fontAlgn="auto" latinLnBrk="0" hangingPunct="1">
-              <a:lnSpc>
-                <a:spcPct val="100000"/>
-              </a:lnSpc>
-              <a:spcBef>
-                <a:spcPts val="0"/>
-              </a:spcBef>
-              <a:spcAft>
-                <a:spcPts val="0"/>
-              </a:spcAft>
-              <a:buClrTx/>
-              <a:buSzTx/>
-              <a:buFontTx/>
-              <a:buNone/>
-              <a:tabLst/>
-              <a:defRPr/>
-            </a:pPr>
-            <a:r>
-              <a:rPr lang="en-US" sz="1200" dirty="0" err="1">
-                <a:solidFill>
-                  <a:srgbClr val="002060"/>
-                </a:solidFill>
-              </a:rPr>
-              <a:t>ResNet</a:t>
-            </a:r>
-            <a:r>
-              <a:rPr lang="en-US" sz="1200" dirty="0">
-                <a:solidFill>
-                  <a:srgbClr val="002060"/>
-                </a:solidFill>
-              </a:rPr>
-              <a:t> basic residual layer</a:t>
-            </a:r>
-          </a:p>
-          <a:p>
             <a:r>
               <a:rPr lang="he-IL" dirty="0"/>
-              <a:t>לדבר על טרייד-אופים: אם ממשים הרבה שכבות כ-</a:t>
-            </a:r>
-            <a:r>
-              <a:rPr lang="en-US" dirty="0"/>
-              <a:t>DCN</a:t>
-            </a:r>
-            <a:r>
-              <a:rPr lang="he-IL" dirty="0"/>
-              <a:t> נצפה לזמן לימוד ארוך. כמו כן לדבר על המיקום שבו נרצה לממש </a:t>
-            </a:r>
-            <a:r>
-              <a:rPr lang="en-US" dirty="0"/>
-              <a:t>DCN</a:t>
-            </a:r>
-            <a:r>
-              <a:rPr lang="he-IL" dirty="0"/>
-              <a:t> – בתחילת השכבות, בסיום, וכו' וכו'</a:t>
-            </a:r>
+              <a:t>אולי להרחיב במעט על הרשתות הידועות ומדוע בחרנו בהן</a:t>
+            </a:r>
+            <a:endParaRPr lang="en-US" dirty="0"/>
+          </a:p>
+          <a:p>
             <a:endParaRPr lang="en-US" dirty="0"/>
           </a:p>
         </p:txBody>
@@ -1639,7 +1606,7 @@
             <a:fld id="{C8C92D0D-AF30-4211-86C4-A3B87597F349}" type="slidenum">
               <a:rPr lang="he-IL" smtClean="0"/>
               <a:pPr/>
-              <a:t>21</a:t>
+              <a:t>20</a:t>
             </a:fld>
             <a:endParaRPr lang="he-IL"/>
           </a:p>
@@ -1650,7 +1617,7 @@
           <p:cNvPr id="5" name="Footer Placeholder 4">
             <a:extLst>
               <a:ext uri="{FF2B5EF4-FFF2-40B4-BE49-F238E27FC236}">
-                <a16:creationId xmlns:a16="http://schemas.microsoft.com/office/drawing/2014/main" id="{C14FCB9D-45E4-4133-908F-C2C828213379}"/>
+                <a16:creationId xmlns:a16="http://schemas.microsoft.com/office/drawing/2014/main" id="{65C03B0E-2E4A-4E8D-89B2-0DF2F71549EE}"/>
               </a:ext>
             </a:extLst>
           </p:cNvPr>
@@ -1676,7 +1643,7 @@
     </p:spTree>
     <p:extLst>
       <p:ext uri="{BB962C8B-B14F-4D97-AF65-F5344CB8AC3E}">
-        <p14:creationId xmlns:p14="http://schemas.microsoft.com/office/powerpoint/2010/main" val="2585679764"/>
+        <p14:creationId xmlns:p14="http://schemas.microsoft.com/office/powerpoint/2010/main" val="1306353171"/>
       </p:ext>
     </p:extLst>
   </p:cSld>
@@ -1732,17 +1699,12 @@
           <a:p>
             <a:r>
               <a:rPr lang="he-IL" dirty="0"/>
-              <a:t>אולי לפרט את התוצאות בפורמט </a:t>
+              <a:t>להסביר שעל השכבות המדוברות נרצה ליישם </a:t>
             </a:r>
             <a:r>
               <a:rPr lang="en-US" dirty="0"/>
-              <a:t>SPECIFICITY</a:t>
-            </a:r>
-            <a:r>
-              <a:rPr lang="he-IL" dirty="0"/>
-              <a:t> וכד' – בעיית המכ"מ</a:t>
-            </a:r>
-            <a:endParaRPr lang="en-US" dirty="0"/>
+              <a:t>DCN</a:t>
+            </a:r>
           </a:p>
         </p:txBody>
       </p:sp>
@@ -1764,7 +1726,7 @@
             <a:fld id="{C8C92D0D-AF30-4211-86C4-A3B87597F349}" type="slidenum">
               <a:rPr lang="he-IL" smtClean="0"/>
               <a:pPr/>
-              <a:t>22</a:t>
+              <a:t>21</a:t>
             </a:fld>
             <a:endParaRPr lang="he-IL"/>
           </a:p>
@@ -1775,7 +1737,7 @@
           <p:cNvPr id="5" name="Footer Placeholder 4">
             <a:extLst>
               <a:ext uri="{FF2B5EF4-FFF2-40B4-BE49-F238E27FC236}">
-                <a16:creationId xmlns:a16="http://schemas.microsoft.com/office/drawing/2014/main" id="{D22B5138-94C3-4ACE-9C44-BB76032A6EB9}"/>
+                <a16:creationId xmlns:a16="http://schemas.microsoft.com/office/drawing/2014/main" id="{EAB95C90-7FCD-4A76-85DB-E96F4FA14E41}"/>
               </a:ext>
             </a:extLst>
           </p:cNvPr>
@@ -1801,7 +1763,7 @@
     </p:spTree>
     <p:extLst>
       <p:ext uri="{BB962C8B-B14F-4D97-AF65-F5344CB8AC3E}">
-        <p14:creationId xmlns:p14="http://schemas.microsoft.com/office/powerpoint/2010/main" val="1648461225"/>
+        <p14:creationId xmlns:p14="http://schemas.microsoft.com/office/powerpoint/2010/main" val="1289365257"/>
       </p:ext>
     </p:extLst>
   </p:cSld>
@@ -1855,10 +1817,174 @@
           <a:bodyPr/>
           <a:lstStyle/>
           <a:p>
+            <a:pPr marL="0" marR="0" lvl="0" indent="0" algn="r" defTabSz="914400" rtl="1" eaLnBrk="1" fontAlgn="auto" latinLnBrk="0" hangingPunct="1">
+              <a:lnSpc>
+                <a:spcPct val="100000"/>
+              </a:lnSpc>
+              <a:spcBef>
+                <a:spcPts val="0"/>
+              </a:spcBef>
+              <a:spcAft>
+                <a:spcPts val="0"/>
+              </a:spcAft>
+              <a:buClrTx/>
+              <a:buSzTx/>
+              <a:buFontTx/>
+              <a:buNone/>
+              <a:tabLst/>
+              <a:defRPr/>
+            </a:pPr>
+            <a:r>
+              <a:rPr lang="en-US" sz="1200" dirty="0" err="1">
+                <a:solidFill>
+                  <a:srgbClr val="002060"/>
+                </a:solidFill>
+              </a:rPr>
+              <a:t>ResNet</a:t>
+            </a:r>
+            <a:r>
+              <a:rPr lang="en-US" sz="1200" dirty="0">
+                <a:solidFill>
+                  <a:srgbClr val="002060"/>
+                </a:solidFill>
+              </a:rPr>
+              <a:t> basic residual layer</a:t>
+            </a:r>
+          </a:p>
+          <a:p>
             <a:r>
               <a:rPr lang="he-IL" dirty="0"/>
-              <a:t>בולט שלישי –לציין את הבעייתיות שבעבודה עם הדאטסטים השונים. ייתכן שיידרש שיפוץ</a:t>
-            </a:r>
+              <a:t>לדבר על טרייד-אופים: אם ממשים הרבה שכבות כ-</a:t>
+            </a:r>
+            <a:r>
+              <a:rPr lang="en-US" dirty="0"/>
+              <a:t>DCN</a:t>
+            </a:r>
+            <a:r>
+              <a:rPr lang="he-IL" dirty="0"/>
+              <a:t> נצפה לזמן לימוד ארוך. כמו כן לדבר על המיקום שבו נרצה לממש </a:t>
+            </a:r>
+            <a:r>
+              <a:rPr lang="en-US" dirty="0"/>
+              <a:t>DCN</a:t>
+            </a:r>
+            <a:r>
+              <a:rPr lang="he-IL" dirty="0"/>
+              <a:t> – בתחילת השכבות, בסיום, וכו' וכו'</a:t>
+            </a:r>
+            <a:endParaRPr lang="en-US" dirty="0"/>
+          </a:p>
+        </p:txBody>
+      </p:sp>
+      <p:sp>
+        <p:nvSpPr>
+          <p:cNvPr id="4" name="Slide Number Placeholder 3"/>
+          <p:cNvSpPr>
+            <a:spLocks noGrp="1"/>
+          </p:cNvSpPr>
+          <p:nvPr>
+            <p:ph type="sldNum" sz="quarter" idx="5"/>
+          </p:nvPr>
+        </p:nvSpPr>
+        <p:spPr/>
+        <p:txBody>
+          <a:bodyPr/>
+          <a:lstStyle/>
+          <a:p>
+            <a:fld id="{C8C92D0D-AF30-4211-86C4-A3B87597F349}" type="slidenum">
+              <a:rPr lang="he-IL" smtClean="0"/>
+              <a:pPr/>
+              <a:t>22</a:t>
+            </a:fld>
+            <a:endParaRPr lang="he-IL"/>
+          </a:p>
+        </p:txBody>
+      </p:sp>
+      <p:sp>
+        <p:nvSpPr>
+          <p:cNvPr id="5" name="Footer Placeholder 4">
+            <a:extLst>
+              <a:ext uri="{FF2B5EF4-FFF2-40B4-BE49-F238E27FC236}">
+                <a16:creationId xmlns:a16="http://schemas.microsoft.com/office/drawing/2014/main" id="{C14FCB9D-45E4-4133-908F-C2C828213379}"/>
+              </a:ext>
+            </a:extLst>
+          </p:cNvPr>
+          <p:cNvSpPr>
+            <a:spLocks noGrp="1"/>
+          </p:cNvSpPr>
+          <p:nvPr>
+            <p:ph type="ftr" sz="quarter" idx="4"/>
+          </p:nvPr>
+        </p:nvSpPr>
+        <p:spPr/>
+        <p:txBody>
+          <a:bodyPr/>
+          <a:lstStyle/>
+          <a:p>
+            <a:r>
+              <a:rPr lang="he-IL"/>
+              <a:t>2</a:t>
+            </a:r>
+          </a:p>
+        </p:txBody>
+      </p:sp>
+    </p:spTree>
+    <p:extLst>
+      <p:ext uri="{BB962C8B-B14F-4D97-AF65-F5344CB8AC3E}">
+        <p14:creationId xmlns:p14="http://schemas.microsoft.com/office/powerpoint/2010/main" val="2585679764"/>
+      </p:ext>
+    </p:extLst>
+  </p:cSld>
+  <p:clrMapOvr>
+    <a:masterClrMapping/>
+  </p:clrMapOvr>
+</p:notes>
+</file>
+
+<file path=ppt/notesSlides/notesSlide19.xml><?xml version="1.0" encoding="utf-8"?>
+<p:notes xmlns:a="http://schemas.openxmlformats.org/drawingml/2006/main" xmlns:r="http://schemas.openxmlformats.org/officeDocument/2006/relationships" xmlns:p="http://schemas.openxmlformats.org/presentationml/2006/main">
+  <p:cSld>
+    <p:spTree>
+      <p:nvGrpSpPr>
+        <p:cNvPr id="1" name=""/>
+        <p:cNvGrpSpPr/>
+        <p:nvPr/>
+      </p:nvGrpSpPr>
+      <p:grpSpPr>
+        <a:xfrm>
+          <a:off x="0" y="0"/>
+          <a:ext cx="0" cy="0"/>
+          <a:chOff x="0" y="0"/>
+          <a:chExt cx="0" cy="0"/>
+        </a:xfrm>
+      </p:grpSpPr>
+      <p:sp>
+        <p:nvSpPr>
+          <p:cNvPr id="2" name="Slide Image Placeholder 1"/>
+          <p:cNvSpPr>
+            <a:spLocks noGrp="1" noRot="1" noChangeAspect="1"/>
+          </p:cNvSpPr>
+          <p:nvPr>
+            <p:ph type="sldImg"/>
+          </p:nvPr>
+        </p:nvSpPr>
+        <p:spPr/>
+      </p:sp>
+      <p:sp>
+        <p:nvSpPr>
+          <p:cNvPr id="3" name="Notes Placeholder 2"/>
+          <p:cNvSpPr>
+            <a:spLocks noGrp="1"/>
+          </p:cNvSpPr>
+          <p:nvPr>
+            <p:ph type="body" idx="1"/>
+          </p:nvPr>
+        </p:nvSpPr>
+        <p:spPr/>
+        <p:txBody>
+          <a:bodyPr/>
+          <a:lstStyle/>
+          <a:p>
             <a:endParaRPr lang="en-US" dirty="0"/>
           </a:p>
         </p:txBody>
@@ -1892,7 +2018,7 @@
           <p:cNvPr id="5" name="Footer Placeholder 4">
             <a:extLst>
               <a:ext uri="{FF2B5EF4-FFF2-40B4-BE49-F238E27FC236}">
-                <a16:creationId xmlns:a16="http://schemas.microsoft.com/office/drawing/2014/main" id="{47D3E8D4-7DE4-457D-948D-A9D1C55C79C0}"/>
+                <a16:creationId xmlns:a16="http://schemas.microsoft.com/office/drawing/2014/main" id="{D22B5138-94C3-4ACE-9C44-BB76032A6EB9}"/>
               </a:ext>
             </a:extLst>
           </p:cNvPr>
@@ -1918,7 +2044,7 @@
     </p:spTree>
     <p:extLst>
       <p:ext uri="{BB962C8B-B14F-4D97-AF65-F5344CB8AC3E}">
-        <p14:creationId xmlns:p14="http://schemas.microsoft.com/office/powerpoint/2010/main" val="4156227241"/>
+        <p14:creationId xmlns:p14="http://schemas.microsoft.com/office/powerpoint/2010/main" val="1648461225"/>
       </p:ext>
     </p:extLst>
   </p:cSld>
@@ -2035,6 +2161,123 @@
     <p:extLst>
       <p:ext uri="{BB962C8B-B14F-4D97-AF65-F5344CB8AC3E}">
         <p14:creationId xmlns:p14="http://schemas.microsoft.com/office/powerpoint/2010/main" val="622024200"/>
+      </p:ext>
+    </p:extLst>
+  </p:cSld>
+  <p:clrMapOvr>
+    <a:masterClrMapping/>
+  </p:clrMapOvr>
+</p:notes>
+</file>
+
+<file path=ppt/notesSlides/notesSlide20.xml><?xml version="1.0" encoding="utf-8"?>
+<p:notes xmlns:a="http://schemas.openxmlformats.org/drawingml/2006/main" xmlns:r="http://schemas.openxmlformats.org/officeDocument/2006/relationships" xmlns:p="http://schemas.openxmlformats.org/presentationml/2006/main">
+  <p:cSld>
+    <p:spTree>
+      <p:nvGrpSpPr>
+        <p:cNvPr id="1" name=""/>
+        <p:cNvGrpSpPr/>
+        <p:nvPr/>
+      </p:nvGrpSpPr>
+      <p:grpSpPr>
+        <a:xfrm>
+          <a:off x="0" y="0"/>
+          <a:ext cx="0" cy="0"/>
+          <a:chOff x="0" y="0"/>
+          <a:chExt cx="0" cy="0"/>
+        </a:xfrm>
+      </p:grpSpPr>
+      <p:sp>
+        <p:nvSpPr>
+          <p:cNvPr id="2" name="Slide Image Placeholder 1"/>
+          <p:cNvSpPr>
+            <a:spLocks noGrp="1" noRot="1" noChangeAspect="1"/>
+          </p:cNvSpPr>
+          <p:nvPr>
+            <p:ph type="sldImg"/>
+          </p:nvPr>
+        </p:nvSpPr>
+        <p:spPr/>
+      </p:sp>
+      <p:sp>
+        <p:nvSpPr>
+          <p:cNvPr id="3" name="Notes Placeholder 2"/>
+          <p:cNvSpPr>
+            <a:spLocks noGrp="1"/>
+          </p:cNvSpPr>
+          <p:nvPr>
+            <p:ph type="body" idx="1"/>
+          </p:nvPr>
+        </p:nvSpPr>
+        <p:spPr/>
+        <p:txBody>
+          <a:bodyPr/>
+          <a:lstStyle/>
+          <a:p>
+            <a:r>
+              <a:rPr lang="he-IL" dirty="0"/>
+              <a:t>בולט שלישי –לציין את הבעייתיות שבעבודה עם הדאטסטים השונים. ייתכן שיידרש שיפוץ</a:t>
+            </a:r>
+            <a:endParaRPr lang="en-US" dirty="0"/>
+          </a:p>
+        </p:txBody>
+      </p:sp>
+      <p:sp>
+        <p:nvSpPr>
+          <p:cNvPr id="4" name="Slide Number Placeholder 3"/>
+          <p:cNvSpPr>
+            <a:spLocks noGrp="1"/>
+          </p:cNvSpPr>
+          <p:nvPr>
+            <p:ph type="sldNum" sz="quarter" idx="5"/>
+          </p:nvPr>
+        </p:nvSpPr>
+        <p:spPr/>
+        <p:txBody>
+          <a:bodyPr/>
+          <a:lstStyle/>
+          <a:p>
+            <a:fld id="{C8C92D0D-AF30-4211-86C4-A3B87597F349}" type="slidenum">
+              <a:rPr lang="he-IL" smtClean="0"/>
+              <a:pPr/>
+              <a:t>24</a:t>
+            </a:fld>
+            <a:endParaRPr lang="he-IL"/>
+          </a:p>
+        </p:txBody>
+      </p:sp>
+      <p:sp>
+        <p:nvSpPr>
+          <p:cNvPr id="5" name="Footer Placeholder 4">
+            <a:extLst>
+              <a:ext uri="{FF2B5EF4-FFF2-40B4-BE49-F238E27FC236}">
+                <a16:creationId xmlns:a16="http://schemas.microsoft.com/office/drawing/2014/main" id="{47D3E8D4-7DE4-457D-948D-A9D1C55C79C0}"/>
+              </a:ext>
+            </a:extLst>
+          </p:cNvPr>
+          <p:cNvSpPr>
+            <a:spLocks noGrp="1"/>
+          </p:cNvSpPr>
+          <p:nvPr>
+            <p:ph type="ftr" sz="quarter" idx="4"/>
+          </p:nvPr>
+        </p:nvSpPr>
+        <p:spPr/>
+        <p:txBody>
+          <a:bodyPr/>
+          <a:lstStyle/>
+          <a:p>
+            <a:r>
+              <a:rPr lang="he-IL"/>
+              <a:t>2</a:t>
+            </a:r>
+          </a:p>
+        </p:txBody>
+      </p:sp>
+    </p:spTree>
+    <p:extLst>
+      <p:ext uri="{BB962C8B-B14F-4D97-AF65-F5344CB8AC3E}">
+        <p14:creationId xmlns:p14="http://schemas.microsoft.com/office/powerpoint/2010/main" val="4156227241"/>
       </p:ext>
     </p:extLst>
   </p:cSld>
@@ -2548,6 +2791,37 @@
             </a:r>
             <a:endParaRPr lang="en-US" dirty="0"/>
           </a:p>
+          <a:p>
+            <a:r>
+              <a:rPr lang="he-IL" dirty="0"/>
+              <a:t>בקצרה: לימוד ראשוני על כל ה</a:t>
+            </a:r>
+            <a:r>
+              <a:rPr lang="en-US" dirty="0"/>
+              <a:t>POSITIVES</a:t>
+            </a:r>
+            <a:r>
+              <a:rPr lang="he-IL" dirty="0"/>
+              <a:t> למציאת קשרים בין </a:t>
+            </a:r>
+            <a:r>
+              <a:rPr lang="en-US" dirty="0"/>
+              <a:t>LABEL</a:t>
+            </a:r>
+            <a:r>
+              <a:rPr lang="he-IL" dirty="0"/>
+              <a:t>ים, ואז אימון על כל ה</a:t>
+            </a:r>
+            <a:r>
+              <a:rPr lang="en-US" dirty="0"/>
+              <a:t>DATASET</a:t>
+            </a:r>
+            <a:r>
+              <a:rPr lang="he-IL" dirty="0"/>
+              <a:t> תוך ניצול הקשרים שנלמדו בשלב ראשון</a:t>
+            </a:r>
+            <a:endParaRPr lang="en-US" dirty="0"/>
+          </a:p>
         </p:txBody>
       </p:sp>
       <p:sp>
@@ -2772,7 +3046,29 @@
           <a:p>
             <a:r>
               <a:rPr lang="he-IL" dirty="0"/>
-              <a:t>לציין שמדובר בשיטות סגמנטציה שונות, ולהדגיש שהתרומה לסבוכיות לא הייתה משמעותית</a:t>
+              <a:t>יש לציין כאן שהלימוד של ה</a:t>
+            </a:r>
+            <a:r>
+              <a:rPr lang="en-US" dirty="0"/>
+              <a:t>OFFSET</a:t>
+            </a:r>
+            <a:r>
+              <a:rPr lang="he-IL" dirty="0"/>
+              <a:t>ים מתבצע במקביל ללימוד של הרשת, דרך שכבת קונוולוציה רגילה</a:t>
+            </a:r>
+          </a:p>
+          <a:p>
+            <a:r>
+              <a:rPr lang="he-IL" dirty="0"/>
+              <a:t>השכבה הזאת מבצעת </a:t>
+            </a:r>
+            <a:r>
+              <a:rPr lang="en-US" dirty="0"/>
+              <a:t>BACKPROP</a:t>
+            </a:r>
+            <a:r>
+              <a:rPr lang="he-IL" dirty="0"/>
+              <a:t> לרשת ולמעשה מתקיימת במקביל לרשת עצמה</a:t>
             </a:r>
             <a:endParaRPr lang="en-US" dirty="0"/>
           </a:p>
@@ -2780,7 +3076,29 @@
       </p:sp>
       <p:sp>
         <p:nvSpPr>
-          <p:cNvPr id="4" name="Slide Number Placeholder 3"/>
+          <p:cNvPr id="4" name="Footer Placeholder 3"/>
+          <p:cNvSpPr>
+            <a:spLocks noGrp="1"/>
+          </p:cNvSpPr>
+          <p:nvPr>
+            <p:ph type="ftr" sz="quarter" idx="4"/>
+          </p:nvPr>
+        </p:nvSpPr>
+        <p:spPr/>
+        <p:txBody>
+          <a:bodyPr/>
+          <a:lstStyle/>
+          <a:p>
+            <a:r>
+              <a:rPr lang="he-IL"/>
+              <a:t>2</a:t>
+            </a:r>
+          </a:p>
+        </p:txBody>
+      </p:sp>
+      <p:sp>
+        <p:nvSpPr>
+          <p:cNvPr id="5" name="Slide Number Placeholder 4"/>
           <p:cNvSpPr>
             <a:spLocks noGrp="1"/>
           </p:cNvSpPr>
@@ -2796,44 +3114,16 @@
             <a:fld id="{C8C92D0D-AF30-4211-86C4-A3B87597F349}" type="slidenum">
               <a:rPr lang="he-IL" smtClean="0"/>
               <a:pPr/>
-              <a:t>13</a:t>
+              <a:t>11</a:t>
             </a:fld>
             <a:endParaRPr lang="he-IL"/>
-          </a:p>
-        </p:txBody>
-      </p:sp>
-      <p:sp>
-        <p:nvSpPr>
-          <p:cNvPr id="5" name="Footer Placeholder 4">
-            <a:extLst>
-              <a:ext uri="{FF2B5EF4-FFF2-40B4-BE49-F238E27FC236}">
-                <a16:creationId xmlns:a16="http://schemas.microsoft.com/office/drawing/2014/main" id="{AD753467-F10B-4164-AC16-609227753711}"/>
-              </a:ext>
-            </a:extLst>
-          </p:cNvPr>
-          <p:cNvSpPr>
-            <a:spLocks noGrp="1"/>
-          </p:cNvSpPr>
-          <p:nvPr>
-            <p:ph type="ftr" sz="quarter" idx="4"/>
-          </p:nvPr>
-        </p:nvSpPr>
-        <p:spPr/>
-        <p:txBody>
-          <a:bodyPr/>
-          <a:lstStyle/>
-          <a:p>
-            <a:r>
-              <a:rPr lang="he-IL"/>
-              <a:t>2</a:t>
-            </a:r>
           </a:p>
         </p:txBody>
       </p:sp>
     </p:spTree>
     <p:extLst>
       <p:ext uri="{BB962C8B-B14F-4D97-AF65-F5344CB8AC3E}">
-        <p14:creationId xmlns:p14="http://schemas.microsoft.com/office/powerpoint/2010/main" val="1110135167"/>
+        <p14:creationId xmlns:p14="http://schemas.microsoft.com/office/powerpoint/2010/main" val="3015799941"/>
       </p:ext>
     </p:extLst>
   </p:cSld>
@@ -2889,30 +3179,9 @@
           <a:p>
             <a:r>
               <a:rPr lang="he-IL" dirty="0"/>
-              <a:t>הפעלת </a:t>
-            </a:r>
-            <a:r>
-              <a:rPr lang="en-US" dirty="0"/>
-              <a:t>DCN</a:t>
-            </a:r>
-            <a:r>
-              <a:rPr lang="he-IL" dirty="0"/>
-              <a:t> על מספר השכבות האחרונות, השוואת תוצאות</a:t>
-            </a:r>
-          </a:p>
-          <a:p>
-            <a:r>
-              <a:rPr lang="en-US" dirty="0" err="1"/>
-              <a:t>mAP,mIoU</a:t>
-            </a:r>
-            <a:r>
-              <a:rPr lang="he-IL" dirty="0"/>
-              <a:t> – שיטות ניקוד שונות עבור זיהוי </a:t>
-            </a:r>
-            <a:r>
-              <a:rPr lang="en-US" dirty="0"/>
-              <a:t>REGIONS</a:t>
-            </a:r>
+              <a:t>לציין שמדובר בשיטות סגמנטציה שונות, ולהדגיש שהתרומה לסבוכיות לא הייתה משמעותית</a:t>
+            </a:r>
+            <a:endParaRPr lang="en-US" dirty="0"/>
           </a:p>
         </p:txBody>
       </p:sp>
@@ -2934,7 +3203,7 @@
             <a:fld id="{C8C92D0D-AF30-4211-86C4-A3B87597F349}" type="slidenum">
               <a:rPr lang="he-IL" smtClean="0"/>
               <a:pPr/>
-              <a:t>14</a:t>
+              <a:t>13</a:t>
             </a:fld>
             <a:endParaRPr lang="he-IL"/>
           </a:p>
@@ -2971,7 +3240,7 @@
     </p:spTree>
     <p:extLst>
       <p:ext uri="{BB962C8B-B14F-4D97-AF65-F5344CB8AC3E}">
-        <p14:creationId xmlns:p14="http://schemas.microsoft.com/office/powerpoint/2010/main" val="4269872321"/>
+        <p14:creationId xmlns:p14="http://schemas.microsoft.com/office/powerpoint/2010/main" val="1110135167"/>
       </p:ext>
     </p:extLst>
   </p:cSld>
@@ -3777,7 +4046,7 @@
           <a:p>
             <a:fld id="{BFD2984C-9D56-40A8-839A-3AF6619B1C81}" type="datetime1">
               <a:rPr lang="en-US" smtClean="0"/>
-              <a:t>06-Jan-20</a:t>
+              <a:t>1/7/2020</a:t>
             </a:fld>
             <a:endParaRPr lang="en-US"/>
           </a:p>
@@ -4024,7 +4293,7 @@
           <a:p>
             <a:fld id="{1408F81D-5BB7-4C4A-AE55-B68165AD758E}" type="datetime1">
               <a:rPr lang="en-US" smtClean="0"/>
-              <a:t>06-Jan-20</a:t>
+              <a:t>1/7/2020</a:t>
             </a:fld>
             <a:endParaRPr lang="en-US"/>
           </a:p>
@@ -5143,7 +5412,7 @@
                 <a:ext cx="7620000" cy="4525963"/>
               </a:xfrm>
               <a:blipFill>
-                <a:blip r:embed="rId2"/>
+                <a:blip r:embed="rId3"/>
                 <a:stretch>
                   <a:fillRect l="-1040" t="-1077" r="-80"/>
                 </a:stretch>
@@ -5209,7 +5478,7 @@
           <p:nvPr/>
         </p:nvPicPr>
         <p:blipFill>
-          <a:blip r:embed="rId3"/>
+          <a:blip r:embed="rId4"/>
           <a:stretch>
             <a:fillRect/>
           </a:stretch>
@@ -5503,23 +5772,7 @@
                   <a:srgbClr val="002060"/>
                 </a:solidFill>
               </a:rPr>
-              <a:t>Deformable </a:t>
-            </a:r>
-            <a:r>
-              <a:rPr lang="en-US" sz="2400" dirty="0" err="1">
-                <a:solidFill>
-                  <a:srgbClr val="002060"/>
-                </a:solidFill>
-              </a:rPr>
-              <a:t>ConvNets</a:t>
-            </a:r>
-            <a:r>
-              <a:rPr lang="en-US" sz="2400" dirty="0">
-                <a:solidFill>
-                  <a:srgbClr val="002060"/>
-                </a:solidFill>
-              </a:rPr>
-              <a:t> only add small overhead over model parameters and computation.</a:t>
+              <a:t>DCNs only add small overhead over model parameters and computation</a:t>
             </a:r>
           </a:p>
         </p:txBody>
@@ -6110,61 +6363,45 @@
         </p:spPr>
         <p:txBody>
           <a:bodyPr>
-            <a:normAutofit lnSpcReduction="10000"/>
+            <a:normAutofit/>
           </a:bodyPr>
           <a:lstStyle/>
           <a:p>
             <a:r>
-              <a:rPr lang="en-US" sz="2400" dirty="0">
-                <a:solidFill>
-                  <a:srgbClr val="002060"/>
-                </a:solidFill>
-              </a:rPr>
-              <a:t>DCNv1 may extend well beyond the region of interest, causing features to be influenced by irrelevant image content.</a:t>
-            </a:r>
-          </a:p>
-          <a:p>
-            <a:r>
-              <a:rPr lang="en-US" sz="2400" dirty="0">
-                <a:solidFill>
-                  <a:srgbClr val="002060"/>
-                </a:solidFill>
-              </a:rPr>
-              <a:t>DCNv2 presents enhanced modeling power for learning deformable convolutions, comes in two complementary forms:</a:t>
-            </a:r>
-          </a:p>
-          <a:p>
-            <a:pPr lvl="1"/>
-            <a:r>
-              <a:rPr lang="en-US" sz="2000" dirty="0">
-                <a:solidFill>
-                  <a:srgbClr val="002060"/>
-                </a:solidFill>
-              </a:rPr>
-              <a:t>Expanded use of deformable convolution layers within the network - allows to control sampling over a broader range of feature levels.</a:t>
-            </a:r>
-          </a:p>
-          <a:p>
-            <a:pPr lvl="1"/>
-            <a:r>
-              <a:rPr lang="en-US" sz="2000" dirty="0">
-                <a:solidFill>
-                  <a:srgbClr val="002060"/>
-                </a:solidFill>
-              </a:rPr>
-              <a:t>DCNv2 incorporates a feature mimicking loss into its training, which favors learning of features consistent to those of R-CNN</a:t>
-            </a:r>
-          </a:p>
-          <a:p>
-            <a:pPr lvl="1"/>
-            <a:r>
-              <a:rPr lang="en-US" sz="2000" dirty="0">
-                <a:solidFill>
-                  <a:srgbClr val="002060"/>
-                </a:solidFill>
-              </a:rPr>
-              <a:t>modulation mechanism in the deformable convolution modules, each sample not only undergoes a learned offset, but is also modulated by a learned feature amplitude.</a:t>
-            </a:r>
+              <a:rPr lang="en-US" sz="2800" dirty="0">
+                <a:solidFill>
+                  <a:srgbClr val="002060"/>
+                </a:solidFill>
+              </a:rPr>
+              <a:t>DCNv1 may extend well beyond the region of interest, causing features to be influenced by irrelevant image content</a:t>
+            </a:r>
+          </a:p>
+          <a:p>
+            <a:pPr marL="0" indent="0">
+              <a:buNone/>
+            </a:pPr>
+            <a:endParaRPr lang="en-US" sz="2800" dirty="0">
+              <a:solidFill>
+                <a:srgbClr val="002060"/>
+              </a:solidFill>
+            </a:endParaRPr>
+          </a:p>
+          <a:p>
+            <a:r>
+              <a:rPr lang="en-US" sz="2800" dirty="0">
+                <a:solidFill>
+                  <a:srgbClr val="002060"/>
+                </a:solidFill>
+              </a:rPr>
+              <a:t>DCNv2 presents enhanced modeling power for learning deformable convolutions</a:t>
+            </a:r>
+          </a:p>
+          <a:p>
+            <a:endParaRPr lang="en-US" sz="2400" dirty="0">
+              <a:solidFill>
+                <a:srgbClr val="002060"/>
+              </a:solidFill>
+            </a:endParaRPr>
           </a:p>
           <a:p>
             <a:pPr marL="457200" lvl="1" indent="0">
@@ -6205,101 +6442,6 @@
               <a:t>16</a:t>
             </a:fld>
             <a:endParaRPr lang="en-US"/>
-          </a:p>
-        </p:txBody>
-      </p:sp>
-      <p:pic>
-        <p:nvPicPr>
-          <p:cNvPr id="5" name="Picture 4">
-            <a:extLst>
-              <a:ext uri="{FF2B5EF4-FFF2-40B4-BE49-F238E27FC236}">
-                <a16:creationId xmlns:a16="http://schemas.microsoft.com/office/drawing/2014/main" id="{65649314-BD93-4C0B-A220-F83EBD365BD7}"/>
-              </a:ext>
-            </a:extLst>
-          </p:cNvPr>
-          <p:cNvPicPr>
-            <a:picLocks noChangeAspect="1"/>
-          </p:cNvPicPr>
-          <p:nvPr/>
-        </p:nvPicPr>
-        <p:blipFill>
-          <a:blip r:embed="rId3"/>
-          <a:stretch>
-            <a:fillRect/>
-          </a:stretch>
-        </p:blipFill>
-        <p:spPr>
-          <a:xfrm>
-            <a:off x="990600" y="5181600"/>
-            <a:ext cx="3390900" cy="1676400"/>
-          </a:xfrm>
-          <a:prstGeom prst="rect">
-            <a:avLst/>
-          </a:prstGeom>
-        </p:spPr>
-      </p:pic>
-      <p:pic>
-        <p:nvPicPr>
-          <p:cNvPr id="6" name="Picture 5">
-            <a:extLst>
-              <a:ext uri="{FF2B5EF4-FFF2-40B4-BE49-F238E27FC236}">
-                <a16:creationId xmlns:a16="http://schemas.microsoft.com/office/drawing/2014/main" id="{653D668A-82F8-401E-98FD-0EC51EF564C4}"/>
-              </a:ext>
-            </a:extLst>
-          </p:cNvPr>
-          <p:cNvPicPr>
-            <a:picLocks noChangeAspect="1"/>
-          </p:cNvPicPr>
-          <p:nvPr/>
-        </p:nvPicPr>
-        <p:blipFill>
-          <a:blip r:embed="rId4"/>
-          <a:stretch>
-            <a:fillRect/>
-          </a:stretch>
-        </p:blipFill>
-        <p:spPr>
-          <a:xfrm>
-            <a:off x="4724400" y="6200775"/>
-            <a:ext cx="3381375" cy="657225"/>
-          </a:xfrm>
-          <a:prstGeom prst="rect">
-            <a:avLst/>
-          </a:prstGeom>
-        </p:spPr>
-      </p:pic>
-      <p:sp>
-        <p:nvSpPr>
-          <p:cNvPr id="7" name="TextBox 6">
-            <a:extLst>
-              <a:ext uri="{FF2B5EF4-FFF2-40B4-BE49-F238E27FC236}">
-                <a16:creationId xmlns:a16="http://schemas.microsoft.com/office/drawing/2014/main" id="{DFE6FDCC-05F2-405C-AAB0-AF0BCEEF5614}"/>
-              </a:ext>
-            </a:extLst>
-          </p:cNvPr>
-          <p:cNvSpPr txBox="1"/>
-          <p:nvPr/>
-        </p:nvSpPr>
-        <p:spPr>
-          <a:xfrm>
-            <a:off x="4914900" y="5879068"/>
-            <a:ext cx="2987040" cy="369332"/>
-          </a:xfrm>
-          <a:prstGeom prst="rect">
-            <a:avLst/>
-          </a:prstGeom>
-          <a:noFill/>
-        </p:spPr>
-        <p:txBody>
-          <a:bodyPr wrap="square" rtlCol="0">
-            <a:spAutoFit/>
-          </a:bodyPr>
-          <a:lstStyle/>
-          <a:p>
-            <a:r>
-              <a:rPr lang="en-US" dirty="0"/>
-              <a:t>Modulated deformable conv</a:t>
-            </a:r>
           </a:p>
         </p:txBody>
       </p:sp>
@@ -6349,6 +6491,291 @@
             <p:ph type="title"/>
           </p:nvPr>
         </p:nvSpPr>
+        <p:spPr/>
+        <p:txBody>
+          <a:bodyPr>
+            <a:normAutofit/>
+          </a:bodyPr>
+          <a:lstStyle/>
+          <a:p>
+            <a:r>
+              <a:rPr lang="en-US" dirty="0">
+                <a:solidFill>
+                  <a:srgbClr val="002060"/>
+                </a:solidFill>
+              </a:rPr>
+              <a:t>DCN V2</a:t>
+            </a:r>
+            <a:endParaRPr lang="en-US" dirty="0"/>
+          </a:p>
+        </p:txBody>
+      </p:sp>
+      <p:sp>
+        <p:nvSpPr>
+          <p:cNvPr id="3" name="Content Placeholder 2">
+            <a:extLst>
+              <a:ext uri="{FF2B5EF4-FFF2-40B4-BE49-F238E27FC236}">
+                <a16:creationId xmlns:a16="http://schemas.microsoft.com/office/drawing/2014/main" id="{FD9D945D-90FF-4CB6-99B8-A86B0C6D048D}"/>
+              </a:ext>
+            </a:extLst>
+          </p:cNvPr>
+          <p:cNvSpPr>
+            <a:spLocks noGrp="1"/>
+          </p:cNvSpPr>
+          <p:nvPr>
+            <p:ph idx="1"/>
+          </p:nvPr>
+        </p:nvSpPr>
+        <p:spPr>
+          <a:xfrm>
+            <a:off x="76200" y="1417638"/>
+            <a:ext cx="8610600" cy="3763962"/>
+          </a:xfrm>
+        </p:spPr>
+        <p:txBody>
+          <a:bodyPr>
+            <a:normAutofit/>
+          </a:bodyPr>
+          <a:lstStyle/>
+          <a:p>
+            <a:pPr lvl="1">
+              <a:buFont typeface="Arial" panose="020B0604020202020204" pitchFamily="34" charset="0"/>
+              <a:buChar char="•"/>
+            </a:pPr>
+            <a:r>
+              <a:rPr lang="en-US" sz="2000" dirty="0">
+                <a:solidFill>
+                  <a:srgbClr val="002060"/>
+                </a:solidFill>
+              </a:rPr>
+              <a:t>Expanded use of deformable convolution layers within the network</a:t>
+            </a:r>
+          </a:p>
+          <a:p>
+            <a:pPr lvl="1">
+              <a:buFont typeface="Arial" panose="020B0604020202020204" pitchFamily="34" charset="0"/>
+              <a:buChar char="•"/>
+            </a:pPr>
+            <a:r>
+              <a:rPr lang="en-US" sz="2000" dirty="0">
+                <a:solidFill>
+                  <a:srgbClr val="002060"/>
+                </a:solidFill>
+              </a:rPr>
+              <a:t>Allows to control sampling over a broader range of feature levels</a:t>
+            </a:r>
+          </a:p>
+          <a:p>
+            <a:pPr lvl="1">
+              <a:buFont typeface="Arial" panose="020B0604020202020204" pitchFamily="34" charset="0"/>
+              <a:buChar char="•"/>
+            </a:pPr>
+            <a:r>
+              <a:rPr lang="en-US" sz="2000" dirty="0">
+                <a:solidFill>
+                  <a:srgbClr val="002060"/>
+                </a:solidFill>
+              </a:rPr>
+              <a:t>Feature mimicking loss - favors learning of features consistent to those of R-CNN</a:t>
+            </a:r>
+          </a:p>
+          <a:p>
+            <a:pPr lvl="1">
+              <a:buFont typeface="Arial" panose="020B0604020202020204" pitchFamily="34" charset="0"/>
+              <a:buChar char="•"/>
+            </a:pPr>
+            <a:r>
+              <a:rPr lang="en-US" sz="2000" dirty="0">
+                <a:solidFill>
+                  <a:srgbClr val="002060"/>
+                </a:solidFill>
+              </a:rPr>
+              <a:t>Each sample not only undergoes a learned offset, but is also modulated by a learned feature amplitude</a:t>
+            </a:r>
+          </a:p>
+          <a:p>
+            <a:pPr marL="457200" lvl="1" indent="0">
+              <a:buNone/>
+            </a:pPr>
+            <a:endParaRPr lang="en-US" sz="2000" dirty="0">
+              <a:solidFill>
+                <a:srgbClr val="002060"/>
+              </a:solidFill>
+            </a:endParaRPr>
+          </a:p>
+        </p:txBody>
+      </p:sp>
+      <p:sp>
+        <p:nvSpPr>
+          <p:cNvPr id="4" name="Slide Number Placeholder 3">
+            <a:extLst>
+              <a:ext uri="{FF2B5EF4-FFF2-40B4-BE49-F238E27FC236}">
+                <a16:creationId xmlns:a16="http://schemas.microsoft.com/office/drawing/2014/main" id="{6ED004E6-B912-45E4-A456-29799468E102}"/>
+              </a:ext>
+            </a:extLst>
+          </p:cNvPr>
+          <p:cNvSpPr>
+            <a:spLocks noGrp="1"/>
+          </p:cNvSpPr>
+          <p:nvPr>
+            <p:ph type="sldNum" sz="quarter" idx="12"/>
+          </p:nvPr>
+        </p:nvSpPr>
+        <p:spPr/>
+        <p:txBody>
+          <a:bodyPr/>
+          <a:lstStyle/>
+          <a:p>
+            <a:fld id="{B01D9778-10B4-40FB-B4E4-44FA89A86639}" type="slidenum">
+              <a:rPr lang="en-US" smtClean="0"/>
+              <a:pPr/>
+              <a:t>17</a:t>
+            </a:fld>
+            <a:endParaRPr lang="en-US"/>
+          </a:p>
+        </p:txBody>
+      </p:sp>
+      <p:pic>
+        <p:nvPicPr>
+          <p:cNvPr id="5" name="Picture 4">
+            <a:extLst>
+              <a:ext uri="{FF2B5EF4-FFF2-40B4-BE49-F238E27FC236}">
+                <a16:creationId xmlns:a16="http://schemas.microsoft.com/office/drawing/2014/main" id="{65649314-BD93-4C0B-A220-F83EBD365BD7}"/>
+              </a:ext>
+            </a:extLst>
+          </p:cNvPr>
+          <p:cNvPicPr>
+            <a:picLocks noChangeAspect="1"/>
+          </p:cNvPicPr>
+          <p:nvPr/>
+        </p:nvPicPr>
+        <p:blipFill>
+          <a:blip r:embed="rId3"/>
+          <a:stretch>
+            <a:fillRect/>
+          </a:stretch>
+        </p:blipFill>
+        <p:spPr>
+          <a:xfrm>
+            <a:off x="838201" y="4216845"/>
+            <a:ext cx="3390900" cy="1676400"/>
+          </a:xfrm>
+          <a:prstGeom prst="rect">
+            <a:avLst/>
+          </a:prstGeom>
+        </p:spPr>
+      </p:pic>
+      <p:pic>
+        <p:nvPicPr>
+          <p:cNvPr id="6" name="Picture 5">
+            <a:extLst>
+              <a:ext uri="{FF2B5EF4-FFF2-40B4-BE49-F238E27FC236}">
+                <a16:creationId xmlns:a16="http://schemas.microsoft.com/office/drawing/2014/main" id="{653D668A-82F8-401E-98FD-0EC51EF564C4}"/>
+              </a:ext>
+            </a:extLst>
+          </p:cNvPr>
+          <p:cNvPicPr>
+            <a:picLocks noChangeAspect="1"/>
+          </p:cNvPicPr>
+          <p:nvPr/>
+        </p:nvPicPr>
+        <p:blipFill>
+          <a:blip r:embed="rId4"/>
+          <a:stretch>
+            <a:fillRect/>
+          </a:stretch>
+        </p:blipFill>
+        <p:spPr>
+          <a:xfrm>
+            <a:off x="4767263" y="4551585"/>
+            <a:ext cx="3381375" cy="657225"/>
+          </a:xfrm>
+          <a:prstGeom prst="rect">
+            <a:avLst/>
+          </a:prstGeom>
+        </p:spPr>
+      </p:pic>
+      <p:sp>
+        <p:nvSpPr>
+          <p:cNvPr id="7" name="TextBox 6">
+            <a:extLst>
+              <a:ext uri="{FF2B5EF4-FFF2-40B4-BE49-F238E27FC236}">
+                <a16:creationId xmlns:a16="http://schemas.microsoft.com/office/drawing/2014/main" id="{DFE6FDCC-05F2-405C-AAB0-AF0BCEEF5614}"/>
+              </a:ext>
+            </a:extLst>
+          </p:cNvPr>
+          <p:cNvSpPr txBox="1"/>
+          <p:nvPr/>
+        </p:nvSpPr>
+        <p:spPr>
+          <a:xfrm>
+            <a:off x="4744226" y="4216598"/>
+            <a:ext cx="2987040" cy="307777"/>
+          </a:xfrm>
+          <a:prstGeom prst="rect">
+            <a:avLst/>
+          </a:prstGeom>
+          <a:noFill/>
+        </p:spPr>
+        <p:txBody>
+          <a:bodyPr wrap="square" rtlCol="0">
+            <a:spAutoFit/>
+          </a:bodyPr>
+          <a:lstStyle/>
+          <a:p>
+            <a:r>
+              <a:rPr lang="en-US" sz="1400" dirty="0"/>
+              <a:t>Modulated deformable conv</a:t>
+            </a:r>
+          </a:p>
+        </p:txBody>
+      </p:sp>
+    </p:spTree>
+    <p:extLst>
+      <p:ext uri="{BB962C8B-B14F-4D97-AF65-F5344CB8AC3E}">
+        <p14:creationId xmlns:p14="http://schemas.microsoft.com/office/powerpoint/2010/main" val="1174640198"/>
+      </p:ext>
+    </p:extLst>
+  </p:cSld>
+  <p:clrMapOvr>
+    <a:masterClrMapping/>
+  </p:clrMapOvr>
+</p:sld>
+</file>
+
+<file path=ppt/slides/slide18.xml><?xml version="1.0" encoding="utf-8"?>
+<p:sld xmlns:a="http://schemas.openxmlformats.org/drawingml/2006/main" xmlns:r="http://schemas.openxmlformats.org/officeDocument/2006/relationships" xmlns:p="http://schemas.openxmlformats.org/presentationml/2006/main">
+  <p:cSld>
+    <p:spTree>
+      <p:nvGrpSpPr>
+        <p:cNvPr id="1" name=""/>
+        <p:cNvGrpSpPr/>
+        <p:nvPr/>
+      </p:nvGrpSpPr>
+      <p:grpSpPr>
+        <a:xfrm>
+          <a:off x="0" y="0"/>
+          <a:ext cx="0" cy="0"/>
+          <a:chOff x="0" y="0"/>
+          <a:chExt cx="0" cy="0"/>
+        </a:xfrm>
+      </p:grpSpPr>
+      <p:sp>
+        <p:nvSpPr>
+          <p:cNvPr id="2" name="Title 1">
+            <a:extLst>
+              <a:ext uri="{FF2B5EF4-FFF2-40B4-BE49-F238E27FC236}">
+                <a16:creationId xmlns:a16="http://schemas.microsoft.com/office/drawing/2014/main" id="{A83A3907-5868-491F-80F2-4633FEEAA9C1}"/>
+              </a:ext>
+            </a:extLst>
+          </p:cNvPr>
+          <p:cNvSpPr>
+            <a:spLocks noGrp="1"/>
+          </p:cNvSpPr>
+          <p:nvPr>
+            <p:ph type="title"/>
+          </p:nvPr>
+        </p:nvSpPr>
         <p:spPr>
           <a:xfrm>
             <a:off x="228600" y="-76200"/>
@@ -6397,8 +6824,8 @@
         </p:blipFill>
         <p:spPr>
           <a:xfrm>
-            <a:off x="693130" y="4169490"/>
-            <a:ext cx="3982547" cy="2160984"/>
+            <a:off x="1056178" y="4002267"/>
+            <a:ext cx="3515822" cy="2291874"/>
           </a:xfrm>
           <a:prstGeom prst="rect">
             <a:avLst/>
@@ -6434,7 +6861,7 @@
             <a:fld id="{B01D9778-10B4-40FB-B4E4-44FA89A86639}" type="slidenum">
               <a:rPr lang="en-US" smtClean="0"/>
               <a:pPr/>
-              <a:t>17</a:t>
+              <a:t>18</a:t>
             </a:fld>
             <a:endParaRPr lang="en-US"/>
           </a:p>
@@ -6462,7 +6889,7 @@
         </p:blipFill>
         <p:spPr>
           <a:xfrm>
-            <a:off x="5305425" y="1037273"/>
+            <a:off x="5324474" y="1120561"/>
             <a:ext cx="3609975" cy="2667000"/>
           </a:xfrm>
           <a:prstGeom prst="rect">
@@ -6492,8 +6919,8 @@
         </p:blipFill>
         <p:spPr>
           <a:xfrm>
-            <a:off x="5140325" y="3730149"/>
-            <a:ext cx="3571875" cy="2600325"/>
+            <a:off x="5343525" y="3983802"/>
+            <a:ext cx="3571875" cy="2667000"/>
           </a:xfrm>
           <a:prstGeom prst="rect">
             <a:avLst/>
@@ -6538,23 +6965,7 @@
                   <a:srgbClr val="002060"/>
                 </a:solidFill>
               </a:rPr>
-              <a:t>Spatial support of nodes in the last layer of the conv5 stage in a regular </a:t>
-            </a:r>
-            <a:r>
-              <a:rPr lang="en-US" sz="2400" dirty="0" err="1">
-                <a:solidFill>
-                  <a:srgbClr val="002060"/>
-                </a:solidFill>
-              </a:rPr>
-              <a:t>ConvNet</a:t>
-            </a:r>
-            <a:r>
-              <a:rPr lang="en-US" sz="2400" dirty="0">
-                <a:solidFill>
-                  <a:srgbClr val="002060"/>
-                </a:solidFill>
-              </a:rPr>
-              <a:t>, DCNv1 and DCNv2.</a:t>
+              <a:t>Spatial support of nodes in last layer conv5 stage in regular CNN, DCNv1 and DCNv2</a:t>
             </a:r>
           </a:p>
         </p:txBody>
@@ -6572,7 +6983,7 @@
 </p:sld>
 </file>
 
-<file path=ppt/slides/slide18.xml><?xml version="1.0" encoding="utf-8"?>
+<file path=ppt/slides/slide19.xml><?xml version="1.0" encoding="utf-8"?>
 <p:sld xmlns:a="http://schemas.openxmlformats.org/drawingml/2006/main" xmlns:r="http://schemas.openxmlformats.org/officeDocument/2006/relationships" xmlns:p="http://schemas.openxmlformats.org/presentationml/2006/main">
   <p:cSld>
     <p:spTree>
@@ -6658,7 +7069,7 @@
             <a:fld id="{B01D9778-10B4-40FB-B4E4-44FA89A86639}" type="slidenum">
               <a:rPr lang="en-US" smtClean="0"/>
               <a:pPr/>
-              <a:t>18</a:t>
+              <a:t>19</a:t>
             </a:fld>
             <a:endParaRPr lang="en-US"/>
           </a:p>
@@ -6702,23 +7113,7 @@
                   <a:srgbClr val="002060"/>
                 </a:solidFill>
               </a:rPr>
-              <a:t>The new version of Deformable </a:t>
-            </a:r>
-            <a:r>
-              <a:rPr lang="en-US" sz="2400" dirty="0" err="1">
-                <a:solidFill>
-                  <a:srgbClr val="002060"/>
-                </a:solidFill>
-              </a:rPr>
-              <a:t>ConvNets</a:t>
-            </a:r>
-            <a:r>
-              <a:rPr lang="en-US" sz="2400" dirty="0">
-                <a:solidFill>
-                  <a:srgbClr val="002060"/>
-                </a:solidFill>
-              </a:rPr>
-              <a:t> yields significant performance gains over the original model</a:t>
+              <a:t>New version yields significant performance gains over the original model</a:t>
             </a:r>
           </a:p>
         </p:txBody>
@@ -6766,189 +7161,6 @@
 </p:sld>
 </file>
 
-<file path=ppt/slides/slide19.xml><?xml version="1.0" encoding="utf-8"?>
-<p:sld xmlns:a="http://schemas.openxmlformats.org/drawingml/2006/main" xmlns:r="http://schemas.openxmlformats.org/officeDocument/2006/relationships" xmlns:p="http://schemas.openxmlformats.org/presentationml/2006/main">
-  <p:cSld>
-    <p:spTree>
-      <p:nvGrpSpPr>
-        <p:cNvPr id="1" name=""/>
-        <p:cNvGrpSpPr/>
-        <p:nvPr/>
-      </p:nvGrpSpPr>
-      <p:grpSpPr>
-        <a:xfrm>
-          <a:off x="0" y="0"/>
-          <a:ext cx="0" cy="0"/>
-          <a:chOff x="0" y="0"/>
-          <a:chExt cx="0" cy="0"/>
-        </a:xfrm>
-      </p:grpSpPr>
-      <p:sp>
-        <p:nvSpPr>
-          <p:cNvPr id="2" name="Title 1"/>
-          <p:cNvSpPr>
-            <a:spLocks noGrp="1"/>
-          </p:cNvSpPr>
-          <p:nvPr>
-            <p:ph type="title"/>
-          </p:nvPr>
-        </p:nvSpPr>
-        <p:spPr/>
-        <p:txBody>
-          <a:bodyPr/>
-          <a:lstStyle/>
-          <a:p>
-            <a:r>
-              <a:rPr lang="en-US" dirty="0">
-                <a:solidFill>
-                  <a:srgbClr val="002060"/>
-                </a:solidFill>
-              </a:rPr>
-              <a:t>Chosen Solution</a:t>
-            </a:r>
-            <a:endParaRPr lang="he-IL" dirty="0">
-              <a:solidFill>
-                <a:srgbClr val="002060"/>
-              </a:solidFill>
-            </a:endParaRPr>
-          </a:p>
-        </p:txBody>
-      </p:sp>
-      <p:sp>
-        <p:nvSpPr>
-          <p:cNvPr id="3" name="Content Placeholder 2"/>
-          <p:cNvSpPr>
-            <a:spLocks noGrp="1"/>
-          </p:cNvSpPr>
-          <p:nvPr>
-            <p:ph idx="1"/>
-          </p:nvPr>
-        </p:nvSpPr>
-        <p:spPr/>
-        <p:txBody>
-          <a:bodyPr>
-            <a:normAutofit/>
-          </a:bodyPr>
-          <a:lstStyle/>
-          <a:p>
-            <a:r>
-              <a:rPr lang="en-US" dirty="0">
-                <a:solidFill>
-                  <a:srgbClr val="002060"/>
-                </a:solidFill>
-              </a:rPr>
-              <a:t>Exploit DCN advantages for improved Pneumonia detection </a:t>
-            </a:r>
-          </a:p>
-          <a:p>
-            <a:r>
-              <a:rPr lang="en-US" dirty="0">
-                <a:solidFill>
-                  <a:srgbClr val="002060"/>
-                </a:solidFill>
-              </a:rPr>
-              <a:t>Integrate DCN into known architectures such as </a:t>
-            </a:r>
-            <a:r>
-              <a:rPr lang="en-US" dirty="0" err="1">
-                <a:solidFill>
-                  <a:srgbClr val="002060"/>
-                </a:solidFill>
-              </a:rPr>
-              <a:t>AlexNet</a:t>
-            </a:r>
-            <a:r>
-              <a:rPr lang="en-US" dirty="0">
-                <a:solidFill>
-                  <a:srgbClr val="002060"/>
-                </a:solidFill>
-              </a:rPr>
-              <a:t>, </a:t>
-            </a:r>
-            <a:r>
-              <a:rPr lang="en-US" dirty="0" err="1">
-                <a:solidFill>
-                  <a:srgbClr val="002060"/>
-                </a:solidFill>
-              </a:rPr>
-              <a:t>ResNet</a:t>
-            </a:r>
-            <a:r>
-              <a:rPr lang="en-US" dirty="0">
-                <a:solidFill>
-                  <a:srgbClr val="002060"/>
-                </a:solidFill>
-              </a:rPr>
-              <a:t>, </a:t>
-            </a:r>
-            <a:r>
-              <a:rPr lang="en-US" dirty="0" err="1">
-                <a:solidFill>
-                  <a:srgbClr val="002060"/>
-                </a:solidFill>
-              </a:rPr>
-              <a:t>DenseNet</a:t>
-            </a:r>
-            <a:endParaRPr lang="en-US" dirty="0">
-              <a:solidFill>
-                <a:srgbClr val="002060"/>
-              </a:solidFill>
-            </a:endParaRPr>
-          </a:p>
-          <a:p>
-            <a:r>
-              <a:rPr lang="en-US" dirty="0">
-                <a:solidFill>
-                  <a:srgbClr val="002060"/>
-                </a:solidFill>
-              </a:rPr>
-              <a:t>Use on datasets such as Kaggle, CheXpert and more</a:t>
-            </a:r>
-            <a:endParaRPr lang="he-IL" dirty="0">
-              <a:solidFill>
-                <a:srgbClr val="002060"/>
-              </a:solidFill>
-            </a:endParaRPr>
-          </a:p>
-        </p:txBody>
-      </p:sp>
-      <p:sp>
-        <p:nvSpPr>
-          <p:cNvPr id="5" name="Slide Number Placeholder 4"/>
-          <p:cNvSpPr>
-            <a:spLocks noGrp="1"/>
-          </p:cNvSpPr>
-          <p:nvPr>
-            <p:ph type="sldNum" sz="quarter" idx="12"/>
-          </p:nvPr>
-        </p:nvSpPr>
-        <p:spPr/>
-        <p:txBody>
-          <a:bodyPr/>
-          <a:lstStyle/>
-          <a:p>
-            <a:fld id="{B01D9778-10B4-40FB-B4E4-44FA89A86639}" type="slidenum">
-              <a:rPr lang="en-US" smtClean="0"/>
-              <a:pPr/>
-              <a:t>19</a:t>
-            </a:fld>
-            <a:endParaRPr lang="en-US"/>
-          </a:p>
-        </p:txBody>
-      </p:sp>
-    </p:spTree>
-    <p:extLst>
-      <p:ext uri="{BB962C8B-B14F-4D97-AF65-F5344CB8AC3E}">
-        <p14:creationId xmlns:p14="http://schemas.microsoft.com/office/powerpoint/2010/main" val="3476935719"/>
-      </p:ext>
-    </p:extLst>
-  </p:cSld>
-  <p:clrMapOvr>
-    <a:masterClrMapping/>
-  </p:clrMapOvr>
-</p:sld>
-</file>
-
 <file path=ppt/slides/slide2.xml><?xml version="1.0" encoding="utf-8"?>
 <p:sld xmlns:a="http://schemas.openxmlformats.org/drawingml/2006/main" xmlns:r="http://schemas.openxmlformats.org/officeDocument/2006/relationships" xmlns:p="http://schemas.openxmlformats.org/presentationml/2006/main">
   <p:cSld>
@@ -7169,6 +7381,189 @@
 </file>
 
 <file path=ppt/slides/slide20.xml><?xml version="1.0" encoding="utf-8"?>
+<p:sld xmlns:a="http://schemas.openxmlformats.org/drawingml/2006/main" xmlns:r="http://schemas.openxmlformats.org/officeDocument/2006/relationships" xmlns:p="http://schemas.openxmlformats.org/presentationml/2006/main">
+  <p:cSld>
+    <p:spTree>
+      <p:nvGrpSpPr>
+        <p:cNvPr id="1" name=""/>
+        <p:cNvGrpSpPr/>
+        <p:nvPr/>
+      </p:nvGrpSpPr>
+      <p:grpSpPr>
+        <a:xfrm>
+          <a:off x="0" y="0"/>
+          <a:ext cx="0" cy="0"/>
+          <a:chOff x="0" y="0"/>
+          <a:chExt cx="0" cy="0"/>
+        </a:xfrm>
+      </p:grpSpPr>
+      <p:sp>
+        <p:nvSpPr>
+          <p:cNvPr id="2" name="Title 1"/>
+          <p:cNvSpPr>
+            <a:spLocks noGrp="1"/>
+          </p:cNvSpPr>
+          <p:nvPr>
+            <p:ph type="title"/>
+          </p:nvPr>
+        </p:nvSpPr>
+        <p:spPr/>
+        <p:txBody>
+          <a:bodyPr/>
+          <a:lstStyle/>
+          <a:p>
+            <a:r>
+              <a:rPr lang="en-US" dirty="0">
+                <a:solidFill>
+                  <a:srgbClr val="002060"/>
+                </a:solidFill>
+              </a:rPr>
+              <a:t>Chosen Solution</a:t>
+            </a:r>
+            <a:endParaRPr lang="he-IL" dirty="0">
+              <a:solidFill>
+                <a:srgbClr val="002060"/>
+              </a:solidFill>
+            </a:endParaRPr>
+          </a:p>
+        </p:txBody>
+      </p:sp>
+      <p:sp>
+        <p:nvSpPr>
+          <p:cNvPr id="3" name="Content Placeholder 2"/>
+          <p:cNvSpPr>
+            <a:spLocks noGrp="1"/>
+          </p:cNvSpPr>
+          <p:nvPr>
+            <p:ph idx="1"/>
+          </p:nvPr>
+        </p:nvSpPr>
+        <p:spPr/>
+        <p:txBody>
+          <a:bodyPr>
+            <a:normAutofit/>
+          </a:bodyPr>
+          <a:lstStyle/>
+          <a:p>
+            <a:r>
+              <a:rPr lang="en-US" dirty="0">
+                <a:solidFill>
+                  <a:srgbClr val="002060"/>
+                </a:solidFill>
+              </a:rPr>
+              <a:t>Exploit DCN advantages for improved Pneumonia detection </a:t>
+            </a:r>
+          </a:p>
+          <a:p>
+            <a:r>
+              <a:rPr lang="en-US" dirty="0">
+                <a:solidFill>
+                  <a:srgbClr val="002060"/>
+                </a:solidFill>
+              </a:rPr>
+              <a:t>Integrate DCN into known architectures such as </a:t>
+            </a:r>
+            <a:r>
+              <a:rPr lang="en-US" dirty="0" err="1">
+                <a:solidFill>
+                  <a:srgbClr val="002060"/>
+                </a:solidFill>
+              </a:rPr>
+              <a:t>AlexNet</a:t>
+            </a:r>
+            <a:r>
+              <a:rPr lang="en-US" dirty="0">
+                <a:solidFill>
+                  <a:srgbClr val="002060"/>
+                </a:solidFill>
+              </a:rPr>
+              <a:t>, </a:t>
+            </a:r>
+            <a:r>
+              <a:rPr lang="en-US" dirty="0" err="1">
+                <a:solidFill>
+                  <a:srgbClr val="002060"/>
+                </a:solidFill>
+              </a:rPr>
+              <a:t>ResNet</a:t>
+            </a:r>
+            <a:r>
+              <a:rPr lang="en-US" dirty="0">
+                <a:solidFill>
+                  <a:srgbClr val="002060"/>
+                </a:solidFill>
+              </a:rPr>
+              <a:t>, </a:t>
+            </a:r>
+            <a:r>
+              <a:rPr lang="en-US" dirty="0" err="1">
+                <a:solidFill>
+                  <a:srgbClr val="002060"/>
+                </a:solidFill>
+              </a:rPr>
+              <a:t>DenseNet</a:t>
+            </a:r>
+            <a:endParaRPr lang="en-US" dirty="0">
+              <a:solidFill>
+                <a:srgbClr val="002060"/>
+              </a:solidFill>
+            </a:endParaRPr>
+          </a:p>
+          <a:p>
+            <a:r>
+              <a:rPr lang="en-US" dirty="0">
+                <a:solidFill>
+                  <a:srgbClr val="002060"/>
+                </a:solidFill>
+              </a:rPr>
+              <a:t>Use on datasets such as Kaggle, CheXpert and more</a:t>
+            </a:r>
+            <a:endParaRPr lang="he-IL" dirty="0">
+              <a:solidFill>
+                <a:srgbClr val="002060"/>
+              </a:solidFill>
+            </a:endParaRPr>
+          </a:p>
+        </p:txBody>
+      </p:sp>
+      <p:sp>
+        <p:nvSpPr>
+          <p:cNvPr id="5" name="Slide Number Placeholder 4"/>
+          <p:cNvSpPr>
+            <a:spLocks noGrp="1"/>
+          </p:cNvSpPr>
+          <p:nvPr>
+            <p:ph type="sldNum" sz="quarter" idx="12"/>
+          </p:nvPr>
+        </p:nvSpPr>
+        <p:spPr/>
+        <p:txBody>
+          <a:bodyPr/>
+          <a:lstStyle/>
+          <a:p>
+            <a:fld id="{B01D9778-10B4-40FB-B4E4-44FA89A86639}" type="slidenum">
+              <a:rPr lang="en-US" smtClean="0"/>
+              <a:pPr/>
+              <a:t>20</a:t>
+            </a:fld>
+            <a:endParaRPr lang="en-US"/>
+          </a:p>
+        </p:txBody>
+      </p:sp>
+    </p:spTree>
+    <p:extLst>
+      <p:ext uri="{BB962C8B-B14F-4D97-AF65-F5344CB8AC3E}">
+        <p14:creationId xmlns:p14="http://schemas.microsoft.com/office/powerpoint/2010/main" val="3476935719"/>
+      </p:ext>
+    </p:extLst>
+  </p:cSld>
+  <p:clrMapOvr>
+    <a:masterClrMapping/>
+  </p:clrMapOvr>
+</p:sld>
+</file>
+
+<file path=ppt/slides/slide21.xml><?xml version="1.0" encoding="utf-8"?>
 <p:sld xmlns:a="http://schemas.openxmlformats.org/drawingml/2006/main" xmlns:r="http://schemas.openxmlformats.org/officeDocument/2006/relationships" xmlns:p="http://schemas.openxmlformats.org/presentationml/2006/main">
   <p:cSld>
     <p:spTree>
@@ -7282,7 +7677,7 @@
             <a:fld id="{B01D9778-10B4-40FB-B4E4-44FA89A86639}" type="slidenum">
               <a:rPr lang="en-US" smtClean="0"/>
               <a:pPr/>
-              <a:t>20</a:t>
+              <a:t>21</a:t>
             </a:fld>
             <a:endParaRPr lang="en-US"/>
           </a:p>
@@ -7302,8 +7697,8 @@
         </p:nvSpPr>
         <p:spPr>
           <a:xfrm>
-            <a:off x="2057400" y="3733800"/>
-            <a:ext cx="2895600" cy="381000"/>
+            <a:off x="2133600" y="3810000"/>
+            <a:ext cx="2819400" cy="285750"/>
           </a:xfrm>
           <a:prstGeom prst="roundRect">
             <a:avLst/>
@@ -7354,8 +7749,8 @@
         </p:nvSpPr>
         <p:spPr>
           <a:xfrm>
-            <a:off x="2057400" y="4724400"/>
-            <a:ext cx="2895600" cy="381000"/>
+            <a:off x="2133598" y="4803775"/>
+            <a:ext cx="2819401" cy="257323"/>
           </a:xfrm>
           <a:prstGeom prst="roundRect">
             <a:avLst/>
@@ -7493,6 +7888,7 @@
             </a:extLst>
           </p:cNvPr>
           <p:cNvCxnSpPr>
+            <a:cxnSpLocks/>
             <a:stCxn id="3" idx="1"/>
             <a:endCxn id="16" idx="3"/>
           </p:cNvCxnSpPr>
@@ -7500,8 +7896,8 @@
         </p:nvCxnSpPr>
         <p:spPr>
           <a:xfrm flipH="1" flipV="1">
-            <a:off x="4953000" y="3924300"/>
-            <a:ext cx="1676400" cy="771615"/>
+            <a:off x="4953000" y="3952875"/>
+            <a:ext cx="1676400" cy="743040"/>
           </a:xfrm>
           <a:prstGeom prst="straightConnector1">
             <a:avLst/>
@@ -7817,7 +8213,7 @@
 </p:sld>
 </file>
 
-<file path=ppt/slides/slide21.xml><?xml version="1.0" encoding="utf-8"?>
+<file path=ppt/slides/slide22.xml><?xml version="1.0" encoding="utf-8"?>
 <p:sld xmlns:a="http://schemas.openxmlformats.org/drawingml/2006/main" xmlns:r="http://schemas.openxmlformats.org/officeDocument/2006/relationships" xmlns:p="http://schemas.openxmlformats.org/presentationml/2006/main">
   <p:cSld>
     <p:spTree>
@@ -7931,7 +8327,7 @@
             <a:fld id="{B01D9778-10B4-40FB-B4E4-44FA89A86639}" type="slidenum">
               <a:rPr lang="en-US" smtClean="0"/>
               <a:pPr/>
-              <a:t>21</a:t>
+              <a:t>22</a:t>
             </a:fld>
             <a:endParaRPr lang="en-US"/>
           </a:p>
@@ -8061,8 +8457,8 @@
         </p:nvSpPr>
         <p:spPr>
           <a:xfrm>
-            <a:off x="5494420" y="2567236"/>
-            <a:ext cx="1896979" cy="480764"/>
+            <a:off x="5539562" y="2567236"/>
+            <a:ext cx="1739543" cy="424871"/>
           </a:xfrm>
           <a:prstGeom prst="roundRect">
             <a:avLst/>
@@ -8113,8 +8509,8 @@
         </p:nvSpPr>
         <p:spPr>
           <a:xfrm>
-            <a:off x="5494421" y="3369254"/>
-            <a:ext cx="1784684" cy="479742"/>
+            <a:off x="5550195" y="3369254"/>
+            <a:ext cx="1728910" cy="424871"/>
           </a:xfrm>
           <a:prstGeom prst="roundRect">
             <a:avLst/>
@@ -8209,8 +8605,8 @@
         </p:nvCxnSpPr>
         <p:spPr>
           <a:xfrm flipV="1">
-            <a:off x="3998495" y="2807618"/>
-            <a:ext cx="1495925" cy="1703830"/>
+            <a:off x="3998495" y="2779672"/>
+            <a:ext cx="1541067" cy="1731776"/>
           </a:xfrm>
           <a:prstGeom prst="straightConnector1">
             <a:avLst/>
@@ -8526,270 +8922,6 @@
 </p:sld>
 </file>
 
-<file path=ppt/slides/slide22.xml><?xml version="1.0" encoding="utf-8"?>
-<p:sld xmlns:a="http://schemas.openxmlformats.org/drawingml/2006/main" xmlns:r="http://schemas.openxmlformats.org/officeDocument/2006/relationships" xmlns:p="http://schemas.openxmlformats.org/presentationml/2006/main">
-  <p:cSld>
-    <p:spTree>
-      <p:nvGrpSpPr>
-        <p:cNvPr id="1" name=""/>
-        <p:cNvGrpSpPr/>
-        <p:nvPr/>
-      </p:nvGrpSpPr>
-      <p:grpSpPr>
-        <a:xfrm>
-          <a:off x="0" y="0"/>
-          <a:ext cx="0" cy="0"/>
-          <a:chOff x="0" y="0"/>
-          <a:chExt cx="0" cy="0"/>
-        </a:xfrm>
-      </p:grpSpPr>
-      <p:sp>
-        <p:nvSpPr>
-          <p:cNvPr id="2" name="Title 1"/>
-          <p:cNvSpPr>
-            <a:spLocks noGrp="1"/>
-          </p:cNvSpPr>
-          <p:nvPr>
-            <p:ph type="title"/>
-          </p:nvPr>
-        </p:nvSpPr>
-        <p:spPr/>
-        <p:txBody>
-          <a:bodyPr/>
-          <a:lstStyle/>
-          <a:p>
-            <a:r>
-              <a:rPr lang="en-US" dirty="0">
-                <a:solidFill>
-                  <a:srgbClr val="002060"/>
-                </a:solidFill>
-              </a:rPr>
-              <a:t>Intermediate Results</a:t>
-            </a:r>
-            <a:endParaRPr lang="he-IL" dirty="0">
-              <a:solidFill>
-                <a:srgbClr val="002060"/>
-              </a:solidFill>
-            </a:endParaRPr>
-          </a:p>
-        </p:txBody>
-      </p:sp>
-      <p:sp>
-        <p:nvSpPr>
-          <p:cNvPr id="3" name="Content Placeholder 2"/>
-          <p:cNvSpPr>
-            <a:spLocks noGrp="1"/>
-          </p:cNvSpPr>
-          <p:nvPr>
-            <p:ph idx="1"/>
-          </p:nvPr>
-        </p:nvSpPr>
-        <p:spPr/>
-        <p:txBody>
-          <a:bodyPr>
-            <a:normAutofit/>
-          </a:bodyPr>
-          <a:lstStyle/>
-          <a:p>
-            <a:r>
-              <a:rPr lang="en-US" dirty="0">
-                <a:solidFill>
-                  <a:srgbClr val="002060"/>
-                </a:solidFill>
-              </a:rPr>
-              <a:t>Acquired datasets - </a:t>
-            </a:r>
-            <a:r>
-              <a:rPr lang="en-US" i="1" dirty="0">
-                <a:solidFill>
-                  <a:srgbClr val="002060"/>
-                </a:solidFill>
-              </a:rPr>
-              <a:t>Kaggle RSNA Challenge</a:t>
-            </a:r>
-            <a:r>
-              <a:rPr lang="en-US" dirty="0">
-                <a:solidFill>
-                  <a:srgbClr val="002060"/>
-                </a:solidFill>
-              </a:rPr>
-              <a:t>, </a:t>
-            </a:r>
-            <a:r>
-              <a:rPr lang="en-US" i="1" dirty="0">
-                <a:solidFill>
-                  <a:srgbClr val="002060"/>
-                </a:solidFill>
-              </a:rPr>
-              <a:t>Kaggle Pneumonia</a:t>
-            </a:r>
-            <a:r>
-              <a:rPr lang="en-US" dirty="0">
-                <a:solidFill>
-                  <a:srgbClr val="002060"/>
-                </a:solidFill>
-              </a:rPr>
-              <a:t>, </a:t>
-            </a:r>
-            <a:r>
-              <a:rPr lang="en-US" i="1" dirty="0">
-                <a:solidFill>
-                  <a:srgbClr val="002060"/>
-                </a:solidFill>
-              </a:rPr>
-              <a:t>CheXpert</a:t>
-            </a:r>
-          </a:p>
-          <a:p>
-            <a:r>
-              <a:rPr lang="en-US" dirty="0">
-                <a:solidFill>
-                  <a:srgbClr val="002060"/>
-                </a:solidFill>
-              </a:rPr>
-              <a:t>Trained known architectures on </a:t>
-            </a:r>
-            <a:r>
-              <a:rPr lang="en-US" i="1" dirty="0">
-                <a:solidFill>
-                  <a:srgbClr val="002060"/>
-                </a:solidFill>
-              </a:rPr>
-              <a:t>Kaggle Pneumonia</a:t>
-            </a:r>
-            <a:r>
-              <a:rPr lang="en-US" dirty="0">
-                <a:solidFill>
-                  <a:srgbClr val="002060"/>
-                </a:solidFill>
-              </a:rPr>
-              <a:t> dataset</a:t>
-            </a:r>
-          </a:p>
-          <a:p>
-            <a:pPr lvl="1"/>
-            <a:r>
-              <a:rPr lang="en-US" dirty="0" err="1">
-                <a:solidFill>
-                  <a:srgbClr val="002060"/>
-                </a:solidFill>
-              </a:rPr>
-              <a:t>AlexNet</a:t>
-            </a:r>
-            <a:r>
-              <a:rPr lang="en-US" dirty="0">
-                <a:solidFill>
-                  <a:srgbClr val="002060"/>
-                </a:solidFill>
-              </a:rPr>
-              <a:t>, </a:t>
-            </a:r>
-            <a:r>
-              <a:rPr lang="en-US" dirty="0" err="1">
-                <a:solidFill>
-                  <a:srgbClr val="002060"/>
-                </a:solidFill>
-              </a:rPr>
-              <a:t>ResNet</a:t>
-            </a:r>
-            <a:r>
-              <a:rPr lang="en-US" dirty="0">
-                <a:solidFill>
-                  <a:srgbClr val="002060"/>
-                </a:solidFill>
-              </a:rPr>
-              <a:t>, </a:t>
-            </a:r>
-            <a:r>
-              <a:rPr lang="en-US" dirty="0" err="1">
-                <a:solidFill>
-                  <a:srgbClr val="002060"/>
-                </a:solidFill>
-              </a:rPr>
-              <a:t>DenseNet</a:t>
-            </a:r>
-            <a:endParaRPr lang="en-US" dirty="0">
-              <a:solidFill>
-                <a:srgbClr val="002060"/>
-              </a:solidFill>
-            </a:endParaRPr>
-          </a:p>
-          <a:p>
-            <a:pPr lvl="1"/>
-            <a:r>
-              <a:rPr lang="en-US" dirty="0">
-                <a:solidFill>
-                  <a:srgbClr val="002060"/>
-                </a:solidFill>
-              </a:rPr>
-              <a:t>Used Transfer Learning for weights</a:t>
-            </a:r>
-          </a:p>
-          <a:p>
-            <a:r>
-              <a:rPr lang="en-US" dirty="0">
-                <a:solidFill>
-                  <a:srgbClr val="002060"/>
-                </a:solidFill>
-              </a:rPr>
-              <a:t>84% accuracy on test set - </a:t>
-            </a:r>
-            <a:r>
-              <a:rPr lang="en-US" dirty="0" err="1">
-                <a:solidFill>
-                  <a:srgbClr val="002060"/>
-                </a:solidFill>
-              </a:rPr>
-              <a:t>ResNet</a:t>
-            </a:r>
-            <a:r>
-              <a:rPr lang="en-US" dirty="0">
-                <a:solidFill>
-                  <a:srgbClr val="002060"/>
-                </a:solidFill>
-              </a:rPr>
-              <a:t> &amp; TL, 25 epochs</a:t>
-            </a:r>
-          </a:p>
-        </p:txBody>
-      </p:sp>
-      <p:sp>
-        <p:nvSpPr>
-          <p:cNvPr id="5" name="Slide Number Placeholder 4"/>
-          <p:cNvSpPr>
-            <a:spLocks noGrp="1"/>
-          </p:cNvSpPr>
-          <p:nvPr>
-            <p:ph type="sldNum" sz="quarter" idx="12"/>
-          </p:nvPr>
-        </p:nvSpPr>
-        <p:spPr/>
-        <p:txBody>
-          <a:bodyPr/>
-          <a:lstStyle/>
-          <a:p>
-            <a:fld id="{B01D9778-10B4-40FB-B4E4-44FA89A86639}" type="slidenum">
-              <a:rPr lang="en-US" smtClean="0"/>
-              <a:pPr/>
-              <a:t>22</a:t>
-            </a:fld>
-            <a:endParaRPr lang="en-US"/>
-          </a:p>
-        </p:txBody>
-      </p:sp>
-    </p:spTree>
-    <p:extLst>
-      <p:ext uri="{BB962C8B-B14F-4D97-AF65-F5344CB8AC3E}">
-        <p14:creationId xmlns:p14="http://schemas.microsoft.com/office/powerpoint/2010/main" val="2145876422"/>
-      </p:ext>
-    </p:extLst>
-  </p:cSld>
-  <p:clrMapOvr>
-    <a:masterClrMapping/>
-  </p:clrMapOvr>
-</p:sld>
-</file>
-
 <file path=ppt/slides/slide23.xml><?xml version="1.0" encoding="utf-8"?>
 <p:sld xmlns:a="http://schemas.openxmlformats.org/drawingml/2006/main" xmlns:r="http://schemas.openxmlformats.org/officeDocument/2006/relationships" xmlns:p="http://schemas.openxmlformats.org/presentationml/2006/main">
   <p:cSld>
@@ -8828,7 +8960,7 @@
                   <a:srgbClr val="002060"/>
                 </a:solidFill>
               </a:rPr>
-              <a:t>Limitations &amp; Conclusions</a:t>
+              <a:t>Intermediate Results</a:t>
             </a:r>
             <a:endParaRPr lang="he-IL" dirty="0">
               <a:solidFill>
@@ -8850,7 +8982,9 @@
         </p:nvSpPr>
         <p:spPr/>
         <p:txBody>
-          <a:bodyPr/>
+          <a:bodyPr>
+            <a:normAutofit/>
+          </a:bodyPr>
           <a:lstStyle/>
           <a:p>
             <a:r>
@@ -8859,35 +8993,159 @@
                   <a:srgbClr val="002060"/>
                 </a:solidFill>
               </a:rPr>
-              <a:t>Regular CNN can achieve decent results on current data (84%-90%)</a:t>
-            </a:r>
-          </a:p>
-          <a:p>
+              <a:t>Acquired datasets - </a:t>
+            </a:r>
+            <a:r>
+              <a:rPr lang="en-US" i="1" dirty="0">
+                <a:solidFill>
+                  <a:srgbClr val="002060"/>
+                </a:solidFill>
+              </a:rPr>
+              <a:t>Kaggle RSNA Challenge</a:t>
+            </a:r>
             <a:r>
               <a:rPr lang="en-US" dirty="0">
                 <a:solidFill>
                   <a:srgbClr val="002060"/>
                 </a:solidFill>
               </a:rPr>
-              <a:t>Data labeling not ideal (pictures fit more than one label, lung opacity label, etc.)</a:t>
-            </a:r>
-          </a:p>
-          <a:p>
+              <a:t>, </a:t>
+            </a:r>
+            <a:r>
+              <a:rPr lang="en-US" i="1" dirty="0">
+                <a:solidFill>
+                  <a:srgbClr val="002060"/>
+                </a:solidFill>
+              </a:rPr>
+              <a:t>Kaggle Pneumonia</a:t>
+            </a:r>
             <a:r>
               <a:rPr lang="en-US" dirty="0">
                 <a:solidFill>
                   <a:srgbClr val="002060"/>
                 </a:solidFill>
               </a:rPr>
-              <a:t>Different datasets to work on with different sizes</a:t>
-            </a:r>
-          </a:p>
-          <a:p>
+              <a:t>, </a:t>
+            </a:r>
+            <a:r>
+              <a:rPr lang="en-US" i="1" dirty="0">
+                <a:solidFill>
+                  <a:srgbClr val="002060"/>
+                </a:solidFill>
+              </a:rPr>
+              <a:t>CheXpert</a:t>
+            </a:r>
+          </a:p>
+          <a:p>
+            <a:r>
+              <a:rPr lang="en-US" dirty="0">
+                <a:solidFill>
+                  <a:srgbClr val="002060"/>
+                </a:solidFill>
+              </a:rPr>
+              <a:t>Trained known architectures on </a:t>
+            </a:r>
+            <a:r>
+              <a:rPr lang="en-US" i="1" dirty="0">
+                <a:solidFill>
+                  <a:srgbClr val="002060"/>
+                </a:solidFill>
+              </a:rPr>
+              <a:t>Kaggle Pneumonia</a:t>
+            </a:r>
+            <a:r>
+              <a:rPr lang="en-US" dirty="0">
+                <a:solidFill>
+                  <a:srgbClr val="002060"/>
+                </a:solidFill>
+              </a:rPr>
+              <a:t> dataset</a:t>
+            </a:r>
+          </a:p>
+          <a:p>
+            <a:pPr lvl="1"/>
+            <a:r>
+              <a:rPr lang="en-US" dirty="0" err="1">
+                <a:solidFill>
+                  <a:srgbClr val="002060"/>
+                </a:solidFill>
+              </a:rPr>
+              <a:t>AlexNet</a:t>
+            </a:r>
+            <a:r>
+              <a:rPr lang="en-US" dirty="0">
+                <a:solidFill>
+                  <a:srgbClr val="002060"/>
+                </a:solidFill>
+              </a:rPr>
+              <a:t>, </a:t>
+            </a:r>
+            <a:r>
+              <a:rPr lang="en-US" dirty="0" err="1">
+                <a:solidFill>
+                  <a:srgbClr val="002060"/>
+                </a:solidFill>
+              </a:rPr>
+              <a:t>ResNet</a:t>
+            </a:r>
+            <a:r>
+              <a:rPr lang="en-US" dirty="0">
+                <a:solidFill>
+                  <a:srgbClr val="002060"/>
+                </a:solidFill>
+              </a:rPr>
+              <a:t>, </a:t>
+            </a:r>
+            <a:r>
+              <a:rPr lang="en-US" dirty="0" err="1">
+                <a:solidFill>
+                  <a:srgbClr val="002060"/>
+                </a:solidFill>
+              </a:rPr>
+              <a:t>DenseNet</a:t>
+            </a:r>
             <a:endParaRPr lang="en-US" dirty="0">
               <a:solidFill>
                 <a:srgbClr val="002060"/>
               </a:solidFill>
             </a:endParaRPr>
+          </a:p>
+          <a:p>
+            <a:pPr lvl="1"/>
+            <a:r>
+              <a:rPr lang="en-US" dirty="0">
+                <a:solidFill>
+                  <a:srgbClr val="002060"/>
+                </a:solidFill>
+              </a:rPr>
+              <a:t>Used Transfer Learning for weights</a:t>
+            </a:r>
+          </a:p>
+          <a:p>
+            <a:r>
+              <a:rPr lang="en-US" dirty="0">
+                <a:solidFill>
+                  <a:srgbClr val="002060"/>
+                </a:solidFill>
+              </a:rPr>
+              <a:t>84% accuracy on test set - </a:t>
+            </a:r>
+            <a:r>
+              <a:rPr lang="en-US" dirty="0" err="1">
+                <a:solidFill>
+                  <a:srgbClr val="002060"/>
+                </a:solidFill>
+              </a:rPr>
+              <a:t>ResNet</a:t>
+            </a:r>
+            <a:r>
+              <a:rPr lang="en-US" dirty="0">
+                <a:solidFill>
+                  <a:srgbClr val="002060"/>
+                </a:solidFill>
+              </a:rPr>
+              <a:t> &amp; TL, 25 epochs</a:t>
+            </a:r>
           </a:p>
         </p:txBody>
       </p:sp>
@@ -8918,7 +9176,7 @@
     </p:spTree>
     <p:extLst>
       <p:ext uri="{BB962C8B-B14F-4D97-AF65-F5344CB8AC3E}">
-        <p14:creationId xmlns:p14="http://schemas.microsoft.com/office/powerpoint/2010/main" val="1669314898"/>
+        <p14:creationId xmlns:p14="http://schemas.microsoft.com/office/powerpoint/2010/main" val="2145876422"/>
       </p:ext>
     </p:extLst>
   </p:cSld>
@@ -8966,7 +9224,7 @@
                   <a:srgbClr val="002060"/>
                 </a:solidFill>
               </a:rPr>
-              <a:t>Future Work</a:t>
+              <a:t>Limitations &amp; Conclusions</a:t>
             </a:r>
             <a:endParaRPr lang="he-IL" dirty="0">
               <a:solidFill>
@@ -8997,7 +9255,7 @@
                   <a:srgbClr val="002060"/>
                 </a:solidFill>
               </a:rPr>
-              <a:t>Try different CNN architectures on dataset</a:t>
+              <a:t>Regular CNN can achieve decent results on current data (84%-90%)</a:t>
             </a:r>
           </a:p>
           <a:p>
@@ -9007,7 +9265,7 @@
                   <a:srgbClr val="002060"/>
                 </a:solidFill>
               </a:rPr>
-              <a:t>Train models on all datasets</a:t>
+              <a:t>Data labeling not ideal (pictures fit more than one label, lung opacity label, etc.)</a:t>
             </a:r>
           </a:p>
           <a:p>
@@ -9017,28 +9275,15 @@
                   <a:srgbClr val="002060"/>
                 </a:solidFill>
               </a:rPr>
-              <a:t>Implement DCN layers to trained architectures</a:t>
-            </a:r>
-          </a:p>
-          <a:p>
-            <a:r>
-              <a:rPr lang="en-US" dirty="0">
-                <a:solidFill>
-                  <a:srgbClr val="002060"/>
-                </a:solidFill>
-              </a:rPr>
-              <a:t>Explore newer DCN version (v2)</a:t>
-            </a:r>
-          </a:p>
-          <a:p>
-            <a:r>
-              <a:rPr lang="en-US" dirty="0">
-                <a:solidFill>
-                  <a:srgbClr val="002060"/>
-                </a:solidFill>
-              </a:rPr>
-              <a:t>Acquire additional datasets from Zebra Medical</a:t>
-            </a:r>
+              <a:t>Different datasets to work on with different sizes</a:t>
+            </a:r>
+          </a:p>
+          <a:p>
+            <a:endParaRPr lang="en-US" dirty="0">
+              <a:solidFill>
+                <a:srgbClr val="002060"/>
+              </a:solidFill>
+            </a:endParaRPr>
           </a:p>
         </p:txBody>
       </p:sp>
@@ -9069,7 +9314,7 @@
     </p:spTree>
     <p:extLst>
       <p:ext uri="{BB962C8B-B14F-4D97-AF65-F5344CB8AC3E}">
-        <p14:creationId xmlns:p14="http://schemas.microsoft.com/office/powerpoint/2010/main" val="194558903"/>
+        <p14:creationId xmlns:p14="http://schemas.microsoft.com/office/powerpoint/2010/main" val="1669314898"/>
       </p:ext>
     </p:extLst>
   </p:cSld>
@@ -9106,6 +9351,157 @@
             <p:ph type="title"/>
           </p:nvPr>
         </p:nvSpPr>
+        <p:spPr/>
+        <p:txBody>
+          <a:bodyPr/>
+          <a:lstStyle/>
+          <a:p>
+            <a:r>
+              <a:rPr lang="en-US" dirty="0">
+                <a:solidFill>
+                  <a:srgbClr val="002060"/>
+                </a:solidFill>
+              </a:rPr>
+              <a:t>Future Work</a:t>
+            </a:r>
+            <a:endParaRPr lang="he-IL" dirty="0">
+              <a:solidFill>
+                <a:srgbClr val="002060"/>
+              </a:solidFill>
+            </a:endParaRPr>
+          </a:p>
+        </p:txBody>
+      </p:sp>
+      <p:sp>
+        <p:nvSpPr>
+          <p:cNvPr id="3" name="Content Placeholder 2"/>
+          <p:cNvSpPr>
+            <a:spLocks noGrp="1"/>
+          </p:cNvSpPr>
+          <p:nvPr>
+            <p:ph idx="1"/>
+          </p:nvPr>
+        </p:nvSpPr>
+        <p:spPr/>
+        <p:txBody>
+          <a:bodyPr/>
+          <a:lstStyle/>
+          <a:p>
+            <a:r>
+              <a:rPr lang="en-US" dirty="0">
+                <a:solidFill>
+                  <a:srgbClr val="002060"/>
+                </a:solidFill>
+              </a:rPr>
+              <a:t>Try different CNN architectures on dataset</a:t>
+            </a:r>
+          </a:p>
+          <a:p>
+            <a:r>
+              <a:rPr lang="en-US" dirty="0">
+                <a:solidFill>
+                  <a:srgbClr val="002060"/>
+                </a:solidFill>
+              </a:rPr>
+              <a:t>Train models on all datasets</a:t>
+            </a:r>
+          </a:p>
+          <a:p>
+            <a:r>
+              <a:rPr lang="en-US" dirty="0">
+                <a:solidFill>
+                  <a:srgbClr val="002060"/>
+                </a:solidFill>
+              </a:rPr>
+              <a:t>Implement DCN layers to trained architectures</a:t>
+            </a:r>
+          </a:p>
+          <a:p>
+            <a:r>
+              <a:rPr lang="en-US" dirty="0">
+                <a:solidFill>
+                  <a:srgbClr val="002060"/>
+                </a:solidFill>
+              </a:rPr>
+              <a:t>Explore newer DCN version (v2)</a:t>
+            </a:r>
+          </a:p>
+          <a:p>
+            <a:r>
+              <a:rPr lang="en-US" dirty="0">
+                <a:solidFill>
+                  <a:srgbClr val="002060"/>
+                </a:solidFill>
+              </a:rPr>
+              <a:t>Acquire additional datasets from Zebra Medical</a:t>
+            </a:r>
+          </a:p>
+        </p:txBody>
+      </p:sp>
+      <p:sp>
+        <p:nvSpPr>
+          <p:cNvPr id="5" name="Slide Number Placeholder 4"/>
+          <p:cNvSpPr>
+            <a:spLocks noGrp="1"/>
+          </p:cNvSpPr>
+          <p:nvPr>
+            <p:ph type="sldNum" sz="quarter" idx="12"/>
+          </p:nvPr>
+        </p:nvSpPr>
+        <p:spPr/>
+        <p:txBody>
+          <a:bodyPr/>
+          <a:lstStyle/>
+          <a:p>
+            <a:fld id="{B01D9778-10B4-40FB-B4E4-44FA89A86639}" type="slidenum">
+              <a:rPr lang="en-US" smtClean="0"/>
+              <a:pPr/>
+              <a:t>25</a:t>
+            </a:fld>
+            <a:endParaRPr lang="en-US"/>
+          </a:p>
+        </p:txBody>
+      </p:sp>
+    </p:spTree>
+    <p:extLst>
+      <p:ext uri="{BB962C8B-B14F-4D97-AF65-F5344CB8AC3E}">
+        <p14:creationId xmlns:p14="http://schemas.microsoft.com/office/powerpoint/2010/main" val="194558903"/>
+      </p:ext>
+    </p:extLst>
+  </p:cSld>
+  <p:clrMapOvr>
+    <a:masterClrMapping/>
+  </p:clrMapOvr>
+</p:sld>
+</file>
+
+<file path=ppt/slides/slide26.xml><?xml version="1.0" encoding="utf-8"?>
+<p:sld xmlns:a="http://schemas.openxmlformats.org/drawingml/2006/main" xmlns:r="http://schemas.openxmlformats.org/officeDocument/2006/relationships" xmlns:p="http://schemas.openxmlformats.org/presentationml/2006/main">
+  <p:cSld>
+    <p:spTree>
+      <p:nvGrpSpPr>
+        <p:cNvPr id="1" name=""/>
+        <p:cNvGrpSpPr/>
+        <p:nvPr/>
+      </p:nvGrpSpPr>
+      <p:grpSpPr>
+        <a:xfrm>
+          <a:off x="0" y="0"/>
+          <a:ext cx="0" cy="0"/>
+          <a:chOff x="0" y="0"/>
+          <a:chExt cx="0" cy="0"/>
+        </a:xfrm>
+      </p:grpSpPr>
+      <p:sp>
+        <p:nvSpPr>
+          <p:cNvPr id="2" name="Title 1"/>
+          <p:cNvSpPr>
+            <a:spLocks noGrp="1"/>
+          </p:cNvSpPr>
+          <p:nvPr>
+            <p:ph type="title"/>
+          </p:nvPr>
+        </p:nvSpPr>
         <p:spPr>
           <a:xfrm>
             <a:off x="438615" y="228600"/>
@@ -9307,7 +9703,7 @@
             <a:fld id="{B01D9778-10B4-40FB-B4E4-44FA89A86639}" type="slidenum">
               <a:rPr lang="en-US" smtClean="0"/>
               <a:pPr/>
-              <a:t>25</a:t>
+              <a:t>26</a:t>
             </a:fld>
             <a:endParaRPr lang="en-US"/>
           </a:p>
@@ -9838,8 +10234,8 @@
         </p:blipFill>
         <p:spPr>
           <a:xfrm>
-            <a:off x="5034196" y="1600200"/>
-            <a:ext cx="3403600" cy="2438400"/>
+            <a:off x="5034196" y="1558823"/>
+            <a:ext cx="3403600" cy="2479777"/>
           </a:xfrm>
         </p:spPr>
       </p:pic>
@@ -9871,8 +10267,8 @@
         </p:blipFill>
         <p:spPr>
           <a:xfrm>
-            <a:off x="5033605" y="4221162"/>
-            <a:ext cx="3404191" cy="2414281"/>
+            <a:off x="5033605" y="4280684"/>
+            <a:ext cx="3404191" cy="2474461"/>
           </a:xfrm>
           <a:prstGeom prst="rect">
             <a:avLst/>
@@ -9906,8 +10302,8 @@
         </p:blipFill>
         <p:spPr bwMode="auto">
           <a:xfrm>
-            <a:off x="1115548" y="1558823"/>
-            <a:ext cx="3009497" cy="2521154"/>
+            <a:off x="706205" y="1558823"/>
+            <a:ext cx="3403600" cy="2479777"/>
           </a:xfrm>
           <a:prstGeom prst="rect">
             <a:avLst/>
@@ -10631,7 +11027,7 @@
                   <a:srgbClr val="002060"/>
                 </a:solidFill>
               </a:rPr>
-              <a:t> preprint arXiv:1911.06475 (2019).‏</a:t>
+              <a:t> preprint arXiv:1911.06475 (2019)</a:t>
             </a:r>
           </a:p>
           <a:p>

</xml_diff>

<commit_message>
Final mid presentation version
</commit_message>
<xml_diff>
--- a/MidPresentation_Andy_Or.pptx
+++ b/MidPresentation_Andy_Or.pptx
@@ -249,7 +249,7 @@
             <a:fld id="{C9B6F397-9295-4C9F-B4B0-31BF9D08FE68}" type="datetimeFigureOut">
               <a:rPr lang="he-IL" smtClean="0"/>
               <a:pPr/>
-              <a:t>י'/טבת/תש"פ</a:t>
+              <a:t>י"א/טבת/תש"פ</a:t>
             </a:fld>
             <a:endParaRPr lang="he-IL"/>
           </a:p>
@@ -420,7 +420,7 @@
             <a:fld id="{543B7BDA-9DDC-4E4C-973D-E4A3E66645CD}" type="datetimeFigureOut">
               <a:rPr lang="he-IL" smtClean="0"/>
               <a:pPr/>
-              <a:t>י'/טבת/תש"פ</a:t>
+              <a:t>י"א/טבת/תש"פ</a:t>
             </a:fld>
             <a:endParaRPr lang="he-IL"/>
           </a:p>
@@ -852,36 +852,48 @@
           <a:p>
             <a:r>
               <a:rPr lang="he-IL" dirty="0"/>
-              <a:t>הפעלת </a:t>
+              <a:t>עיוות מסיכת ה</a:t>
             </a:r>
             <a:r>
               <a:rPr lang="en-US" dirty="0"/>
-              <a:t>DCN</a:t>
+              <a:t>POOLING</a:t>
             </a:r>
             <a:r>
               <a:rPr lang="he-IL" dirty="0"/>
-              <a:t> על מספר השכבות האחרונות, השוואת תוצאות</a:t>
-            </a:r>
-          </a:p>
-          <a:p>
-            <a:r>
-              <a:rPr lang="en-US" dirty="0" err="1"/>
-              <a:t>mAP,mIoU</a:t>
-            </a:r>
-            <a:r>
-              <a:rPr lang="he-IL" dirty="0"/>
-              <a:t> – שיטות ניקוד שונות עבור זיהוי </a:t>
+              <a:t> בתוך </a:t>
             </a:r>
             <a:r>
               <a:rPr lang="en-US" dirty="0"/>
-              <a:t>REGIONS</a:t>
-            </a:r>
-          </a:p>
-        </p:txBody>
-      </p:sp>
-      <p:sp>
-        <p:nvSpPr>
-          <p:cNvPr id="4" name="Slide Number Placeholder 3"/>
+              <a:t>ROI</a:t>
+            </a:r>
+          </a:p>
+        </p:txBody>
+      </p:sp>
+      <p:sp>
+        <p:nvSpPr>
+          <p:cNvPr id="4" name="Footer Placeholder 3"/>
+          <p:cNvSpPr>
+            <a:spLocks noGrp="1"/>
+          </p:cNvSpPr>
+          <p:nvPr>
+            <p:ph type="ftr" sz="quarter" idx="4"/>
+          </p:nvPr>
+        </p:nvSpPr>
+        <p:spPr/>
+        <p:txBody>
+          <a:bodyPr/>
+          <a:lstStyle/>
+          <a:p>
+            <a:r>
+              <a:rPr lang="he-IL"/>
+              <a:t>2</a:t>
+            </a:r>
+          </a:p>
+        </p:txBody>
+      </p:sp>
+      <p:sp>
+        <p:nvSpPr>
+          <p:cNvPr id="5" name="Slide Number Placeholder 4"/>
           <p:cNvSpPr>
             <a:spLocks noGrp="1"/>
           </p:cNvSpPr>
@@ -897,44 +909,16 @@
             <a:fld id="{C8C92D0D-AF30-4211-86C4-A3B87597F349}" type="slidenum">
               <a:rPr lang="he-IL" smtClean="0"/>
               <a:pPr/>
-              <a:t>14</a:t>
+              <a:t>12</a:t>
             </a:fld>
             <a:endParaRPr lang="he-IL"/>
-          </a:p>
-        </p:txBody>
-      </p:sp>
-      <p:sp>
-        <p:nvSpPr>
-          <p:cNvPr id="5" name="Footer Placeholder 4">
-            <a:extLst>
-              <a:ext uri="{FF2B5EF4-FFF2-40B4-BE49-F238E27FC236}">
-                <a16:creationId xmlns:a16="http://schemas.microsoft.com/office/drawing/2014/main" id="{AD753467-F10B-4164-AC16-609227753711}"/>
-              </a:ext>
-            </a:extLst>
-          </p:cNvPr>
-          <p:cNvSpPr>
-            <a:spLocks noGrp="1"/>
-          </p:cNvSpPr>
-          <p:nvPr>
-            <p:ph type="ftr" sz="quarter" idx="4"/>
-          </p:nvPr>
-        </p:nvSpPr>
-        <p:spPr/>
-        <p:txBody>
-          <a:bodyPr/>
-          <a:lstStyle/>
-          <a:p>
-            <a:r>
-              <a:rPr lang="he-IL"/>
-              <a:t>2</a:t>
-            </a:r>
           </a:p>
         </p:txBody>
       </p:sp>
     </p:spTree>
     <p:extLst>
       <p:ext uri="{BB962C8B-B14F-4D97-AF65-F5344CB8AC3E}">
-        <p14:creationId xmlns:p14="http://schemas.microsoft.com/office/powerpoint/2010/main" val="4269872321"/>
+        <p14:creationId xmlns:p14="http://schemas.microsoft.com/office/powerpoint/2010/main" val="2555120750"/>
       </p:ext>
     </p:extLst>
   </p:cSld>
@@ -990,27 +974,7 @@
           <a:p>
             <a:r>
               <a:rPr lang="he-IL" dirty="0"/>
-              <a:t>להסביר מה זה </a:t>
-            </a:r>
-            <a:r>
-              <a:rPr lang="en-US" dirty="0"/>
-              <a:t>COCO DETECTION CHALLENGE</a:t>
-            </a:r>
-            <a:r>
-              <a:rPr lang="he-IL" dirty="0"/>
-              <a:t>:</a:t>
-            </a:r>
-          </a:p>
-          <a:p>
-            <a:r>
-              <a:rPr lang="en-US" dirty="0"/>
-              <a:t>Common Objects in Context</a:t>
-            </a:r>
-          </a:p>
-          <a:p>
-            <a:r>
-              <a:rPr lang="he-IL" dirty="0"/>
-              <a:t>זה  דאטה סט שמכיל מעלה מ300,000 תמונות, מתוכן בערך 200,000 מתויגות. המטרה – זיהוי עצמים (למעלה מ100 תגיות שונות)</a:t>
+              <a:t>לציין שמדובר בשיטות סגמנטציה שונות, ולהדגיש שהתרומה לסבוכיות לא הייתה משמעותית</a:t>
             </a:r>
             <a:endParaRPr lang="en-US" dirty="0"/>
           </a:p>
@@ -1034,7 +998,7 @@
             <a:fld id="{C8C92D0D-AF30-4211-86C4-A3B87597F349}" type="slidenum">
               <a:rPr lang="he-IL" smtClean="0"/>
               <a:pPr/>
-              <a:t>15</a:t>
+              <a:t>13</a:t>
             </a:fld>
             <a:endParaRPr lang="he-IL"/>
           </a:p>
@@ -1071,7 +1035,7 @@
     </p:spTree>
     <p:extLst>
       <p:ext uri="{BB962C8B-B14F-4D97-AF65-F5344CB8AC3E}">
-        <p14:creationId xmlns:p14="http://schemas.microsoft.com/office/powerpoint/2010/main" val="3966368392"/>
+        <p14:creationId xmlns:p14="http://schemas.microsoft.com/office/powerpoint/2010/main" val="1110135167"/>
       </p:ext>
     </p:extLst>
   </p:cSld>
@@ -1125,7 +1089,70 @@
           <a:bodyPr/>
           <a:lstStyle/>
           <a:p>
-            <a:endParaRPr lang="en-US" dirty="0"/>
+            <a:r>
+              <a:rPr lang="he-IL" dirty="0"/>
+              <a:t>הפעלת </a:t>
+            </a:r>
+            <a:r>
+              <a:rPr lang="en-US" dirty="0"/>
+              <a:t>DCN</a:t>
+            </a:r>
+            <a:r>
+              <a:rPr lang="he-IL" dirty="0"/>
+              <a:t> על מספר השכבות האחרונות, השוואת תוצאות</a:t>
+            </a:r>
+          </a:p>
+          <a:p>
+            <a:r>
+              <a:rPr lang="en-US" dirty="0"/>
+              <a:t>TO</a:t>
+            </a:r>
+            <a:r>
+              <a:rPr lang="he-IL" dirty="0"/>
+              <a:t> – זמן ריצה, כמות פרמטרים, לעומת דיוק בתוצאות</a:t>
+            </a:r>
+          </a:p>
+          <a:p>
+            <a:r>
+              <a:rPr lang="en-US" dirty="0" err="1"/>
+              <a:t>mAP,mIoU</a:t>
+            </a:r>
+            <a:r>
+              <a:rPr lang="he-IL" dirty="0"/>
+              <a:t> – שיטות ניקוד שונות עבור זיהוי </a:t>
+            </a:r>
+            <a:r>
+              <a:rPr lang="en-US" dirty="0"/>
+              <a:t>REGIONS</a:t>
+            </a:r>
+          </a:p>
+          <a:p>
+            <a:r>
+              <a:rPr lang="en-US" dirty="0"/>
+              <a:t>mean Average Precision</a:t>
+            </a:r>
+          </a:p>
+          <a:p>
+            <a:r>
+              <a:rPr lang="en-US" dirty="0"/>
+              <a:t>Precision = TP/(TP+TF)</a:t>
+            </a:r>
+          </a:p>
+          <a:p>
+            <a:r>
+              <a:rPr lang="en-US" dirty="0"/>
+              <a:t>mean Intersection of Unions</a:t>
+            </a:r>
+          </a:p>
+          <a:p>
+            <a:r>
+              <a:rPr lang="en-US" dirty="0" err="1"/>
+              <a:t>IoU</a:t>
+            </a:r>
+            <a:r>
+              <a:rPr lang="en-US" dirty="0"/>
+              <a:t> = Intersection/Union</a:t>
+            </a:r>
           </a:p>
         </p:txBody>
       </p:sp>
@@ -1147,7 +1174,7 @@
             <a:fld id="{C8C92D0D-AF30-4211-86C4-A3B87597F349}" type="slidenum">
               <a:rPr lang="he-IL" smtClean="0"/>
               <a:pPr/>
-              <a:t>16</a:t>
+              <a:t>14</a:t>
             </a:fld>
             <a:endParaRPr lang="he-IL"/>
           </a:p>
@@ -1184,7 +1211,7 @@
     </p:spTree>
     <p:extLst>
       <p:ext uri="{BB962C8B-B14F-4D97-AF65-F5344CB8AC3E}">
-        <p14:creationId xmlns:p14="http://schemas.microsoft.com/office/powerpoint/2010/main" val="2969221266"/>
+        <p14:creationId xmlns:p14="http://schemas.microsoft.com/office/powerpoint/2010/main" val="4269872321"/>
       </p:ext>
     </p:extLst>
   </p:cSld>
@@ -1238,6 +1265,81 @@
           <a:bodyPr/>
           <a:lstStyle/>
           <a:p>
+            <a:r>
+              <a:rPr lang="he-IL" dirty="0"/>
+              <a:t>להסביר מה זה </a:t>
+            </a:r>
+            <a:r>
+              <a:rPr lang="en-US" dirty="0"/>
+              <a:t>COCO DETECTION CHALLENGE</a:t>
+            </a:r>
+            <a:r>
+              <a:rPr lang="he-IL" dirty="0"/>
+              <a:t>:</a:t>
+            </a:r>
+          </a:p>
+          <a:p>
+            <a:r>
+              <a:rPr lang="en-US" dirty="0"/>
+              <a:t>Common Objects in Context</a:t>
+            </a:r>
+          </a:p>
+          <a:p>
+            <a:r>
+              <a:rPr lang="he-IL" dirty="0"/>
+              <a:t>זה  דאטה סט שמכיל מעלה מ300,000 תמונות, מתוכן בערך 200,000 מתויגות. המטרה – זיהוי עצמים (למעלה מ100 תגיות שונות)</a:t>
+            </a:r>
+            <a:endParaRPr lang="en-US" dirty="0"/>
+          </a:p>
+          <a:p>
+            <a:r>
+              <a:rPr lang="en-US" sz="1200" b="1" i="0" kern="1200" dirty="0">
+                <a:solidFill>
+                  <a:schemeClr val="tx1"/>
+                </a:solidFill>
+                <a:effectLst/>
+                <a:latin typeface="+mn-lt"/>
+                <a:ea typeface="+mn-ea"/>
+                <a:cs typeface="+mn-cs"/>
+              </a:rPr>
+              <a:t>M</a:t>
+            </a:r>
+            <a:r>
+              <a:rPr lang="en-US" sz="1200" b="0" i="0" kern="1200" dirty="0">
+                <a:solidFill>
+                  <a:schemeClr val="tx1"/>
+                </a:solidFill>
+                <a:effectLst/>
+                <a:latin typeface="+mn-lt"/>
+                <a:ea typeface="+mn-ea"/>
+                <a:cs typeface="+mn-cs"/>
+              </a:rPr>
+              <a:t>: Multi-Scale Testing with Shorter Side {480, 576, 688, 864, 1200, 1400}</a:t>
+            </a:r>
+            <a:r>
+              <a:rPr lang="en-US" sz="1200" b="1" i="0" kern="1200" dirty="0">
+                <a:solidFill>
+                  <a:schemeClr val="tx1"/>
+                </a:solidFill>
+                <a:effectLst/>
+                <a:latin typeface="+mn-lt"/>
+                <a:ea typeface="+mn-ea"/>
+                <a:cs typeface="+mn-cs"/>
+              </a:rPr>
+              <a:t>, B</a:t>
+            </a:r>
+            <a:r>
+              <a:rPr lang="en-US" sz="1200" b="0" i="0" kern="1200" dirty="0">
+                <a:solidFill>
+                  <a:schemeClr val="tx1"/>
+                </a:solidFill>
+                <a:effectLst/>
+                <a:latin typeface="+mn-lt"/>
+                <a:ea typeface="+mn-ea"/>
+                <a:cs typeface="+mn-cs"/>
+              </a:rPr>
+              <a:t>: Iterative Bounding Box Average</a:t>
+            </a:r>
             <a:endParaRPr lang="en-US" dirty="0"/>
           </a:p>
         </p:txBody>
@@ -1260,7 +1362,7 @@
             <a:fld id="{C8C92D0D-AF30-4211-86C4-A3B87597F349}" type="slidenum">
               <a:rPr lang="he-IL" smtClean="0"/>
               <a:pPr/>
-              <a:t>17</a:t>
+              <a:t>15</a:t>
             </a:fld>
             <a:endParaRPr lang="he-IL"/>
           </a:p>
@@ -1297,7 +1399,7 @@
     </p:spTree>
     <p:extLst>
       <p:ext uri="{BB962C8B-B14F-4D97-AF65-F5344CB8AC3E}">
-        <p14:creationId xmlns:p14="http://schemas.microsoft.com/office/powerpoint/2010/main" val="2491454129"/>
+        <p14:creationId xmlns:p14="http://schemas.microsoft.com/office/powerpoint/2010/main" val="3966368392"/>
       </p:ext>
     </p:extLst>
   </p:cSld>
@@ -1373,7 +1475,7 @@
             <a:fld id="{C8C92D0D-AF30-4211-86C4-A3B87597F349}" type="slidenum">
               <a:rPr lang="he-IL" smtClean="0"/>
               <a:pPr/>
-              <a:t>18</a:t>
+              <a:t>16</a:t>
             </a:fld>
             <a:endParaRPr lang="he-IL"/>
           </a:p>
@@ -1410,7 +1512,7 @@
     </p:spTree>
     <p:extLst>
       <p:ext uri="{BB962C8B-B14F-4D97-AF65-F5344CB8AC3E}">
-        <p14:creationId xmlns:p14="http://schemas.microsoft.com/office/powerpoint/2010/main" val="1491496478"/>
+        <p14:creationId xmlns:p14="http://schemas.microsoft.com/office/powerpoint/2010/main" val="2969221266"/>
       </p:ext>
     </p:extLst>
   </p:cSld>
@@ -1464,7 +1566,10 @@
           <a:bodyPr/>
           <a:lstStyle/>
           <a:p>
-            <a:endParaRPr lang="en-US" dirty="0"/>
+            <a:r>
+              <a:rPr lang="en-US" dirty="0"/>
+              <a:t>Make use of teacher network – provides guidance during training, specifically utilization of R-CNN</a:t>
+            </a:r>
           </a:p>
         </p:txBody>
       </p:sp>
@@ -1486,7 +1591,7 @@
             <a:fld id="{C8C92D0D-AF30-4211-86C4-A3B87597F349}" type="slidenum">
               <a:rPr lang="he-IL" smtClean="0"/>
               <a:pPr/>
-              <a:t>19</a:t>
+              <a:t>17</a:t>
             </a:fld>
             <a:endParaRPr lang="he-IL"/>
           </a:p>
@@ -1523,7 +1628,7 @@
     </p:spTree>
     <p:extLst>
       <p:ext uri="{BB962C8B-B14F-4D97-AF65-F5344CB8AC3E}">
-        <p14:creationId xmlns:p14="http://schemas.microsoft.com/office/powerpoint/2010/main" val="3047872805"/>
+        <p14:creationId xmlns:p14="http://schemas.microsoft.com/office/powerpoint/2010/main" val="2491454129"/>
       </p:ext>
     </p:extLst>
   </p:cSld>
@@ -1577,13 +1682,6 @@
           <a:bodyPr/>
           <a:lstStyle/>
           <a:p>
-            <a:r>
-              <a:rPr lang="he-IL" dirty="0"/>
-              <a:t>אולי להרחיב במעט על הרשתות הידועות ומדוע בחרנו בהן</a:t>
-            </a:r>
-            <a:endParaRPr lang="en-US" dirty="0"/>
-          </a:p>
-          <a:p>
             <a:endParaRPr lang="en-US" dirty="0"/>
           </a:p>
         </p:txBody>
@@ -1606,7 +1704,7 @@
             <a:fld id="{C8C92D0D-AF30-4211-86C4-A3B87597F349}" type="slidenum">
               <a:rPr lang="he-IL" smtClean="0"/>
               <a:pPr/>
-              <a:t>20</a:t>
+              <a:t>18</a:t>
             </a:fld>
             <a:endParaRPr lang="he-IL"/>
           </a:p>
@@ -1617,7 +1715,7 @@
           <p:cNvPr id="5" name="Footer Placeholder 4">
             <a:extLst>
               <a:ext uri="{FF2B5EF4-FFF2-40B4-BE49-F238E27FC236}">
-                <a16:creationId xmlns:a16="http://schemas.microsoft.com/office/drawing/2014/main" id="{65C03B0E-2E4A-4E8D-89B2-0DF2F71549EE}"/>
+                <a16:creationId xmlns:a16="http://schemas.microsoft.com/office/drawing/2014/main" id="{AD753467-F10B-4164-AC16-609227753711}"/>
               </a:ext>
             </a:extLst>
           </p:cNvPr>
@@ -1643,7 +1741,7 @@
     </p:spTree>
     <p:extLst>
       <p:ext uri="{BB962C8B-B14F-4D97-AF65-F5344CB8AC3E}">
-        <p14:creationId xmlns:p14="http://schemas.microsoft.com/office/powerpoint/2010/main" val="1306353171"/>
+        <p14:creationId xmlns:p14="http://schemas.microsoft.com/office/powerpoint/2010/main" val="1491496478"/>
       </p:ext>
     </p:extLst>
   </p:cSld>
@@ -1697,14 +1795,7 @@
           <a:bodyPr/>
           <a:lstStyle/>
           <a:p>
-            <a:r>
-              <a:rPr lang="he-IL" dirty="0"/>
-              <a:t>להסביר שעל השכבות המדוברות נרצה ליישם </a:t>
-            </a:r>
-            <a:r>
-              <a:rPr lang="en-US" dirty="0"/>
-              <a:t>DCN</a:t>
-            </a:r>
+            <a:endParaRPr lang="en-US" dirty="0"/>
           </a:p>
         </p:txBody>
       </p:sp>
@@ -1726,7 +1817,7 @@
             <a:fld id="{C8C92D0D-AF30-4211-86C4-A3B87597F349}" type="slidenum">
               <a:rPr lang="he-IL" smtClean="0"/>
               <a:pPr/>
-              <a:t>21</a:t>
+              <a:t>19</a:t>
             </a:fld>
             <a:endParaRPr lang="he-IL"/>
           </a:p>
@@ -1737,7 +1828,7 @@
           <p:cNvPr id="5" name="Footer Placeholder 4">
             <a:extLst>
               <a:ext uri="{FF2B5EF4-FFF2-40B4-BE49-F238E27FC236}">
-                <a16:creationId xmlns:a16="http://schemas.microsoft.com/office/drawing/2014/main" id="{EAB95C90-7FCD-4A76-85DB-E96F4FA14E41}"/>
+                <a16:creationId xmlns:a16="http://schemas.microsoft.com/office/drawing/2014/main" id="{AD753467-F10B-4164-AC16-609227753711}"/>
               </a:ext>
             </a:extLst>
           </p:cNvPr>
@@ -1763,7 +1854,7 @@
     </p:spTree>
     <p:extLst>
       <p:ext uri="{BB962C8B-B14F-4D97-AF65-F5344CB8AC3E}">
-        <p14:creationId xmlns:p14="http://schemas.microsoft.com/office/powerpoint/2010/main" val="1289365257"/>
+        <p14:creationId xmlns:p14="http://schemas.microsoft.com/office/powerpoint/2010/main" val="3047872805"/>
       </p:ext>
     </p:extLst>
   </p:cSld>
@@ -1817,61 +1908,13 @@
           <a:bodyPr/>
           <a:lstStyle/>
           <a:p>
-            <a:pPr marL="0" marR="0" lvl="0" indent="0" algn="r" defTabSz="914400" rtl="1" eaLnBrk="1" fontAlgn="auto" latinLnBrk="0" hangingPunct="1">
-              <a:lnSpc>
-                <a:spcPct val="100000"/>
-              </a:lnSpc>
-              <a:spcBef>
-                <a:spcPts val="0"/>
-              </a:spcBef>
-              <a:spcAft>
-                <a:spcPts val="0"/>
-              </a:spcAft>
-              <a:buClrTx/>
-              <a:buSzTx/>
-              <a:buFontTx/>
-              <a:buNone/>
-              <a:tabLst/>
-              <a:defRPr/>
-            </a:pPr>
-            <a:r>
-              <a:rPr lang="en-US" sz="1200" dirty="0" err="1">
-                <a:solidFill>
-                  <a:srgbClr val="002060"/>
-                </a:solidFill>
-              </a:rPr>
-              <a:t>ResNet</a:t>
-            </a:r>
-            <a:r>
-              <a:rPr lang="en-US" sz="1200" dirty="0">
-                <a:solidFill>
-                  <a:srgbClr val="002060"/>
-                </a:solidFill>
-              </a:rPr>
-              <a:t> basic residual layer</a:t>
-            </a:r>
-          </a:p>
-          <a:p>
             <a:r>
               <a:rPr lang="he-IL" dirty="0"/>
-              <a:t>לדבר על טרייד-אופים: אם ממשים הרבה שכבות כ-</a:t>
-            </a:r>
-            <a:r>
-              <a:rPr lang="en-US" dirty="0"/>
-              <a:t>DCN</a:t>
-            </a:r>
-            <a:r>
-              <a:rPr lang="he-IL" dirty="0"/>
-              <a:t> נצפה לזמן לימוד ארוך. כמו כן לדבר על המיקום שבו נרצה לממש </a:t>
-            </a:r>
-            <a:r>
-              <a:rPr lang="en-US" dirty="0"/>
-              <a:t>DCN</a:t>
-            </a:r>
-            <a:r>
-              <a:rPr lang="he-IL" dirty="0"/>
-              <a:t> – בתחילת השכבות, בסיום, וכו' וכו'</a:t>
-            </a:r>
+              <a:t>אולי להרחיב במעט על הרשתות הידועות ומדוע בחרנו בהן</a:t>
+            </a:r>
+            <a:endParaRPr lang="en-US" dirty="0"/>
+          </a:p>
+          <a:p>
             <a:endParaRPr lang="en-US" dirty="0"/>
           </a:p>
         </p:txBody>
@@ -1894,7 +1937,7 @@
             <a:fld id="{C8C92D0D-AF30-4211-86C4-A3B87597F349}" type="slidenum">
               <a:rPr lang="he-IL" smtClean="0"/>
               <a:pPr/>
-              <a:t>22</a:t>
+              <a:t>20</a:t>
             </a:fld>
             <a:endParaRPr lang="he-IL"/>
           </a:p>
@@ -1905,7 +1948,7 @@
           <p:cNvPr id="5" name="Footer Placeholder 4">
             <a:extLst>
               <a:ext uri="{FF2B5EF4-FFF2-40B4-BE49-F238E27FC236}">
-                <a16:creationId xmlns:a16="http://schemas.microsoft.com/office/drawing/2014/main" id="{C14FCB9D-45E4-4133-908F-C2C828213379}"/>
+                <a16:creationId xmlns:a16="http://schemas.microsoft.com/office/drawing/2014/main" id="{65C03B0E-2E4A-4E8D-89B2-0DF2F71549EE}"/>
               </a:ext>
             </a:extLst>
           </p:cNvPr>
@@ -1931,7 +1974,7 @@
     </p:spTree>
     <p:extLst>
       <p:ext uri="{BB962C8B-B14F-4D97-AF65-F5344CB8AC3E}">
-        <p14:creationId xmlns:p14="http://schemas.microsoft.com/office/powerpoint/2010/main" val="2585679764"/>
+        <p14:creationId xmlns:p14="http://schemas.microsoft.com/office/powerpoint/2010/main" val="1306353171"/>
       </p:ext>
     </p:extLst>
   </p:cSld>
@@ -1985,7 +2028,14 @@
           <a:bodyPr/>
           <a:lstStyle/>
           <a:p>
-            <a:endParaRPr lang="en-US" dirty="0"/>
+            <a:r>
+              <a:rPr lang="he-IL" dirty="0"/>
+              <a:t>להסביר שעל השכבות המדוברות נרצה ליישם </a:t>
+            </a:r>
+            <a:r>
+              <a:rPr lang="en-US" dirty="0"/>
+              <a:t>DCN</a:t>
+            </a:r>
           </a:p>
         </p:txBody>
       </p:sp>
@@ -2007,7 +2057,7 @@
             <a:fld id="{C8C92D0D-AF30-4211-86C4-A3B87597F349}" type="slidenum">
               <a:rPr lang="he-IL" smtClean="0"/>
               <a:pPr/>
-              <a:t>23</a:t>
+              <a:t>21</a:t>
             </a:fld>
             <a:endParaRPr lang="he-IL"/>
           </a:p>
@@ -2018,7 +2068,7 @@
           <p:cNvPr id="5" name="Footer Placeholder 4">
             <a:extLst>
               <a:ext uri="{FF2B5EF4-FFF2-40B4-BE49-F238E27FC236}">
-                <a16:creationId xmlns:a16="http://schemas.microsoft.com/office/drawing/2014/main" id="{D22B5138-94C3-4ACE-9C44-BB76032A6EB9}"/>
+                <a16:creationId xmlns:a16="http://schemas.microsoft.com/office/drawing/2014/main" id="{EAB95C90-7FCD-4A76-85DB-E96F4FA14E41}"/>
               </a:ext>
             </a:extLst>
           </p:cNvPr>
@@ -2044,7 +2094,7 @@
     </p:spTree>
     <p:extLst>
       <p:ext uri="{BB962C8B-B14F-4D97-AF65-F5344CB8AC3E}">
-        <p14:creationId xmlns:p14="http://schemas.microsoft.com/office/powerpoint/2010/main" val="1648461225"/>
+        <p14:creationId xmlns:p14="http://schemas.microsoft.com/office/powerpoint/2010/main" val="1289365257"/>
       </p:ext>
     </p:extLst>
   </p:cSld>
@@ -2214,6 +2264,287 @@
           <a:bodyPr/>
           <a:lstStyle/>
           <a:p>
+            <a:pPr marL="0" marR="0" lvl="0" indent="0" algn="r" defTabSz="914400" rtl="1" eaLnBrk="1" fontAlgn="auto" latinLnBrk="0" hangingPunct="1">
+              <a:lnSpc>
+                <a:spcPct val="100000"/>
+              </a:lnSpc>
+              <a:spcBef>
+                <a:spcPts val="0"/>
+              </a:spcBef>
+              <a:spcAft>
+                <a:spcPts val="0"/>
+              </a:spcAft>
+              <a:buClrTx/>
+              <a:buSzTx/>
+              <a:buFontTx/>
+              <a:buNone/>
+              <a:tabLst/>
+              <a:defRPr/>
+            </a:pPr>
+            <a:r>
+              <a:rPr lang="en-US" sz="1200" dirty="0" err="1">
+                <a:solidFill>
+                  <a:srgbClr val="002060"/>
+                </a:solidFill>
+              </a:rPr>
+              <a:t>ResNet</a:t>
+            </a:r>
+            <a:r>
+              <a:rPr lang="en-US" sz="1200" dirty="0">
+                <a:solidFill>
+                  <a:srgbClr val="002060"/>
+                </a:solidFill>
+              </a:rPr>
+              <a:t> basic residual layer</a:t>
+            </a:r>
+          </a:p>
+          <a:p>
+            <a:r>
+              <a:rPr lang="he-IL" dirty="0"/>
+              <a:t>לדבר על טרייד-אופים: אם ממשים הרבה שכבות כ-</a:t>
+            </a:r>
+            <a:r>
+              <a:rPr lang="en-US" dirty="0"/>
+              <a:t>DCN</a:t>
+            </a:r>
+            <a:r>
+              <a:rPr lang="he-IL" dirty="0"/>
+              <a:t> נצפה לזמן לימוד ארוך. כמו כן לדבר על המיקום שבו נרצה לממש </a:t>
+            </a:r>
+            <a:r>
+              <a:rPr lang="en-US" dirty="0"/>
+              <a:t>DCN</a:t>
+            </a:r>
+            <a:r>
+              <a:rPr lang="he-IL" dirty="0"/>
+              <a:t> – בתחילת השכבות, בסיום, וכו' וכו'</a:t>
+            </a:r>
+            <a:endParaRPr lang="en-US" dirty="0"/>
+          </a:p>
+        </p:txBody>
+      </p:sp>
+      <p:sp>
+        <p:nvSpPr>
+          <p:cNvPr id="4" name="Slide Number Placeholder 3"/>
+          <p:cNvSpPr>
+            <a:spLocks noGrp="1"/>
+          </p:cNvSpPr>
+          <p:nvPr>
+            <p:ph type="sldNum" sz="quarter" idx="5"/>
+          </p:nvPr>
+        </p:nvSpPr>
+        <p:spPr/>
+        <p:txBody>
+          <a:bodyPr/>
+          <a:lstStyle/>
+          <a:p>
+            <a:fld id="{C8C92D0D-AF30-4211-86C4-A3B87597F349}" type="slidenum">
+              <a:rPr lang="he-IL" smtClean="0"/>
+              <a:pPr/>
+              <a:t>22</a:t>
+            </a:fld>
+            <a:endParaRPr lang="he-IL"/>
+          </a:p>
+        </p:txBody>
+      </p:sp>
+      <p:sp>
+        <p:nvSpPr>
+          <p:cNvPr id="5" name="Footer Placeholder 4">
+            <a:extLst>
+              <a:ext uri="{FF2B5EF4-FFF2-40B4-BE49-F238E27FC236}">
+                <a16:creationId xmlns:a16="http://schemas.microsoft.com/office/drawing/2014/main" id="{C14FCB9D-45E4-4133-908F-C2C828213379}"/>
+              </a:ext>
+            </a:extLst>
+          </p:cNvPr>
+          <p:cNvSpPr>
+            <a:spLocks noGrp="1"/>
+          </p:cNvSpPr>
+          <p:nvPr>
+            <p:ph type="ftr" sz="quarter" idx="4"/>
+          </p:nvPr>
+        </p:nvSpPr>
+        <p:spPr/>
+        <p:txBody>
+          <a:bodyPr/>
+          <a:lstStyle/>
+          <a:p>
+            <a:r>
+              <a:rPr lang="he-IL"/>
+              <a:t>2</a:t>
+            </a:r>
+          </a:p>
+        </p:txBody>
+      </p:sp>
+    </p:spTree>
+    <p:extLst>
+      <p:ext uri="{BB962C8B-B14F-4D97-AF65-F5344CB8AC3E}">
+        <p14:creationId xmlns:p14="http://schemas.microsoft.com/office/powerpoint/2010/main" val="2585679764"/>
+      </p:ext>
+    </p:extLst>
+  </p:cSld>
+  <p:clrMapOvr>
+    <a:masterClrMapping/>
+  </p:clrMapOvr>
+</p:notes>
+</file>
+
+<file path=ppt/notesSlides/notesSlide21.xml><?xml version="1.0" encoding="utf-8"?>
+<p:notes xmlns:a="http://schemas.openxmlformats.org/drawingml/2006/main" xmlns:r="http://schemas.openxmlformats.org/officeDocument/2006/relationships" xmlns:p="http://schemas.openxmlformats.org/presentationml/2006/main">
+  <p:cSld>
+    <p:spTree>
+      <p:nvGrpSpPr>
+        <p:cNvPr id="1" name=""/>
+        <p:cNvGrpSpPr/>
+        <p:nvPr/>
+      </p:nvGrpSpPr>
+      <p:grpSpPr>
+        <a:xfrm>
+          <a:off x="0" y="0"/>
+          <a:ext cx="0" cy="0"/>
+          <a:chOff x="0" y="0"/>
+          <a:chExt cx="0" cy="0"/>
+        </a:xfrm>
+      </p:grpSpPr>
+      <p:sp>
+        <p:nvSpPr>
+          <p:cNvPr id="2" name="Slide Image Placeholder 1"/>
+          <p:cNvSpPr>
+            <a:spLocks noGrp="1" noRot="1" noChangeAspect="1"/>
+          </p:cNvSpPr>
+          <p:nvPr>
+            <p:ph type="sldImg"/>
+          </p:nvPr>
+        </p:nvSpPr>
+        <p:spPr/>
+      </p:sp>
+      <p:sp>
+        <p:nvSpPr>
+          <p:cNvPr id="3" name="Notes Placeholder 2"/>
+          <p:cNvSpPr>
+            <a:spLocks noGrp="1"/>
+          </p:cNvSpPr>
+          <p:nvPr>
+            <p:ph type="body" idx="1"/>
+          </p:nvPr>
+        </p:nvSpPr>
+        <p:spPr/>
+        <p:txBody>
+          <a:bodyPr/>
+          <a:lstStyle/>
+          <a:p>
+            <a:endParaRPr lang="en-US" dirty="0"/>
+          </a:p>
+        </p:txBody>
+      </p:sp>
+      <p:sp>
+        <p:nvSpPr>
+          <p:cNvPr id="4" name="Slide Number Placeholder 3"/>
+          <p:cNvSpPr>
+            <a:spLocks noGrp="1"/>
+          </p:cNvSpPr>
+          <p:nvPr>
+            <p:ph type="sldNum" sz="quarter" idx="5"/>
+          </p:nvPr>
+        </p:nvSpPr>
+        <p:spPr/>
+        <p:txBody>
+          <a:bodyPr/>
+          <a:lstStyle/>
+          <a:p>
+            <a:fld id="{C8C92D0D-AF30-4211-86C4-A3B87597F349}" type="slidenum">
+              <a:rPr lang="he-IL" smtClean="0"/>
+              <a:pPr/>
+              <a:t>23</a:t>
+            </a:fld>
+            <a:endParaRPr lang="he-IL"/>
+          </a:p>
+        </p:txBody>
+      </p:sp>
+      <p:sp>
+        <p:nvSpPr>
+          <p:cNvPr id="5" name="Footer Placeholder 4">
+            <a:extLst>
+              <a:ext uri="{FF2B5EF4-FFF2-40B4-BE49-F238E27FC236}">
+                <a16:creationId xmlns:a16="http://schemas.microsoft.com/office/drawing/2014/main" id="{D22B5138-94C3-4ACE-9C44-BB76032A6EB9}"/>
+              </a:ext>
+            </a:extLst>
+          </p:cNvPr>
+          <p:cNvSpPr>
+            <a:spLocks noGrp="1"/>
+          </p:cNvSpPr>
+          <p:nvPr>
+            <p:ph type="ftr" sz="quarter" idx="4"/>
+          </p:nvPr>
+        </p:nvSpPr>
+        <p:spPr/>
+        <p:txBody>
+          <a:bodyPr/>
+          <a:lstStyle/>
+          <a:p>
+            <a:r>
+              <a:rPr lang="he-IL"/>
+              <a:t>2</a:t>
+            </a:r>
+          </a:p>
+        </p:txBody>
+      </p:sp>
+    </p:spTree>
+    <p:extLst>
+      <p:ext uri="{BB962C8B-B14F-4D97-AF65-F5344CB8AC3E}">
+        <p14:creationId xmlns:p14="http://schemas.microsoft.com/office/powerpoint/2010/main" val="1648461225"/>
+      </p:ext>
+    </p:extLst>
+  </p:cSld>
+  <p:clrMapOvr>
+    <a:masterClrMapping/>
+  </p:clrMapOvr>
+</p:notes>
+</file>
+
+<file path=ppt/notesSlides/notesSlide22.xml><?xml version="1.0" encoding="utf-8"?>
+<p:notes xmlns:a="http://schemas.openxmlformats.org/drawingml/2006/main" xmlns:r="http://schemas.openxmlformats.org/officeDocument/2006/relationships" xmlns:p="http://schemas.openxmlformats.org/presentationml/2006/main">
+  <p:cSld>
+    <p:spTree>
+      <p:nvGrpSpPr>
+        <p:cNvPr id="1" name=""/>
+        <p:cNvGrpSpPr/>
+        <p:nvPr/>
+      </p:nvGrpSpPr>
+      <p:grpSpPr>
+        <a:xfrm>
+          <a:off x="0" y="0"/>
+          <a:ext cx="0" cy="0"/>
+          <a:chOff x="0" y="0"/>
+          <a:chExt cx="0" cy="0"/>
+        </a:xfrm>
+      </p:grpSpPr>
+      <p:sp>
+        <p:nvSpPr>
+          <p:cNvPr id="2" name="Slide Image Placeholder 1"/>
+          <p:cNvSpPr>
+            <a:spLocks noGrp="1" noRot="1" noChangeAspect="1"/>
+          </p:cNvSpPr>
+          <p:nvPr>
+            <p:ph type="sldImg"/>
+          </p:nvPr>
+        </p:nvSpPr>
+        <p:spPr/>
+      </p:sp>
+      <p:sp>
+        <p:nvSpPr>
+          <p:cNvPr id="3" name="Notes Placeholder 2"/>
+          <p:cNvSpPr>
+            <a:spLocks noGrp="1"/>
+          </p:cNvSpPr>
+          <p:nvPr>
+            <p:ph type="body" idx="1"/>
+          </p:nvPr>
+        </p:nvSpPr>
+        <p:spPr/>
+        <p:txBody>
+          <a:bodyPr/>
+          <a:lstStyle/>
+          <a:p>
             <a:r>
               <a:rPr lang="he-IL" dirty="0"/>
               <a:t>בולט שלישי –לציין את הבעייתיות שבעבודה עם הדאטסטים השונים. ייתכן שיידרש שיפוץ</a:t>
@@ -2333,14 +2664,36 @@
           <a:p>
             <a:r>
               <a:rPr lang="en-US" dirty="0"/>
-              <a:t>March 18</a:t>
-            </a:r>
-          </a:p>
-        </p:txBody>
-      </p:sp>
-      <p:sp>
-        <p:nvSpPr>
-          <p:cNvPr id="4" name="Slide Number Placeholder 3"/>
+              <a:t>500,000 hospital visits and 50,000 deaths in the us 2015 </a:t>
+            </a:r>
+          </a:p>
+        </p:txBody>
+      </p:sp>
+      <p:sp>
+        <p:nvSpPr>
+          <p:cNvPr id="4" name="Footer Placeholder 3"/>
+          <p:cNvSpPr>
+            <a:spLocks noGrp="1"/>
+          </p:cNvSpPr>
+          <p:nvPr>
+            <p:ph type="ftr" sz="quarter" idx="4"/>
+          </p:nvPr>
+        </p:nvSpPr>
+        <p:spPr/>
+        <p:txBody>
+          <a:bodyPr/>
+          <a:lstStyle/>
+          <a:p>
+            <a:r>
+              <a:rPr lang="he-IL"/>
+              <a:t>2</a:t>
+            </a:r>
+          </a:p>
+        </p:txBody>
+      </p:sp>
+      <p:sp>
+        <p:nvSpPr>
+          <p:cNvPr id="5" name="Slide Number Placeholder 4"/>
           <p:cNvSpPr>
             <a:spLocks noGrp="1"/>
           </p:cNvSpPr>
@@ -2356,44 +2709,16 @@
             <a:fld id="{C8C92D0D-AF30-4211-86C4-A3B87597F349}" type="slidenum">
               <a:rPr lang="he-IL" smtClean="0"/>
               <a:pPr/>
-              <a:t>6</a:t>
+              <a:t>3</a:t>
             </a:fld>
             <a:endParaRPr lang="he-IL"/>
-          </a:p>
-        </p:txBody>
-      </p:sp>
-      <p:sp>
-        <p:nvSpPr>
-          <p:cNvPr id="5" name="Footer Placeholder 4">
-            <a:extLst>
-              <a:ext uri="{FF2B5EF4-FFF2-40B4-BE49-F238E27FC236}">
-                <a16:creationId xmlns:a16="http://schemas.microsoft.com/office/drawing/2014/main" id="{46A56810-4239-4E06-994C-98EEFAA097A2}"/>
-              </a:ext>
-            </a:extLst>
-          </p:cNvPr>
-          <p:cNvSpPr>
-            <a:spLocks noGrp="1"/>
-          </p:cNvSpPr>
-          <p:nvPr>
-            <p:ph type="ftr" sz="quarter" idx="4"/>
-          </p:nvPr>
-        </p:nvSpPr>
-        <p:spPr/>
-        <p:txBody>
-          <a:bodyPr/>
-          <a:lstStyle/>
-          <a:p>
-            <a:r>
-              <a:rPr lang="he-IL"/>
-              <a:t>2</a:t>
-            </a:r>
           </a:p>
         </p:txBody>
       </p:sp>
     </p:spTree>
     <p:extLst>
       <p:ext uri="{BB962C8B-B14F-4D97-AF65-F5344CB8AC3E}">
-        <p14:creationId xmlns:p14="http://schemas.microsoft.com/office/powerpoint/2010/main" val="2599285607"/>
+        <p14:creationId xmlns:p14="http://schemas.microsoft.com/office/powerpoint/2010/main" val="1439835480"/>
       </p:ext>
     </p:extLst>
   </p:cSld>
@@ -2449,59 +2774,7 @@
           <a:p>
             <a:r>
               <a:rPr lang="en-US" dirty="0"/>
-              <a:t>RSNA </a:t>
-            </a:r>
-            <a:r>
-              <a:rPr lang="he-IL" dirty="0"/>
-              <a:t>– החברה הצפון האמריקאית לרדיולוגיה</a:t>
-            </a:r>
-            <a:endParaRPr lang="en-US" dirty="0"/>
-          </a:p>
-          <a:p>
-            <a:r>
-              <a:rPr lang="he-IL" dirty="0"/>
-              <a:t>הציעו את האתגר לאחר שיצא הדאטה-סט הראשון</a:t>
-            </a:r>
-            <a:endParaRPr lang="en-US" dirty="0"/>
-          </a:p>
-          <a:p>
-            <a:r>
-              <a:rPr lang="en-US" dirty="0"/>
-              <a:t>Closed a year ago</a:t>
-            </a:r>
-            <a:endParaRPr lang="he-IL" dirty="0"/>
-          </a:p>
-          <a:p>
-            <a:pPr marL="0" marR="0" lvl="0" indent="0" algn="r" defTabSz="914400" rtl="1" eaLnBrk="1" fontAlgn="auto" latinLnBrk="0" hangingPunct="1">
-              <a:lnSpc>
-                <a:spcPct val="100000"/>
-              </a:lnSpc>
-              <a:spcBef>
-                <a:spcPts val="0"/>
-              </a:spcBef>
-              <a:spcAft>
-                <a:spcPts val="0"/>
-              </a:spcAft>
-              <a:buClrTx/>
-              <a:buSzTx/>
-              <a:buFontTx/>
-              <a:buNone/>
-              <a:tabLst/>
-              <a:defRPr/>
-            </a:pPr>
-            <a:r>
-              <a:rPr lang="en-US" dirty="0">
-                <a:solidFill>
-                  <a:srgbClr val="002060"/>
-                </a:solidFill>
-              </a:rPr>
-              <a:t>Best results score 0.25475</a:t>
-            </a:r>
-          </a:p>
-          <a:p>
-            <a:r>
-              <a:rPr lang="en-US" dirty="0"/>
-              <a:t>Average of Intersection over Union in bounding boxes</a:t>
+              <a:t>March 18</a:t>
             </a:r>
           </a:p>
         </p:txBody>
@@ -2524,7 +2797,7 @@
             <a:fld id="{C8C92D0D-AF30-4211-86C4-A3B87597F349}" type="slidenum">
               <a:rPr lang="he-IL" smtClean="0"/>
               <a:pPr/>
-              <a:t>7</a:t>
+              <a:t>6</a:t>
             </a:fld>
             <a:endParaRPr lang="he-IL"/>
           </a:p>
@@ -2535,7 +2808,7 @@
           <p:cNvPr id="5" name="Footer Placeholder 4">
             <a:extLst>
               <a:ext uri="{FF2B5EF4-FFF2-40B4-BE49-F238E27FC236}">
-                <a16:creationId xmlns:a16="http://schemas.microsoft.com/office/drawing/2014/main" id="{F1B846EA-2635-40F4-912F-3C058728FFC0}"/>
+                <a16:creationId xmlns:a16="http://schemas.microsoft.com/office/drawing/2014/main" id="{46A56810-4239-4E06-994C-98EEFAA097A2}"/>
               </a:ext>
             </a:extLst>
           </p:cNvPr>
@@ -2561,7 +2834,7 @@
     </p:spTree>
     <p:extLst>
       <p:ext uri="{BB962C8B-B14F-4D97-AF65-F5344CB8AC3E}">
-        <p14:creationId xmlns:p14="http://schemas.microsoft.com/office/powerpoint/2010/main" val="223982526"/>
+        <p14:creationId xmlns:p14="http://schemas.microsoft.com/office/powerpoint/2010/main" val="2599285607"/>
       </p:ext>
     </p:extLst>
   </p:cSld>
@@ -2617,27 +2890,25 @@
           <a:p>
             <a:r>
               <a:rPr lang="en-US" dirty="0"/>
-              <a:t>CHEXPERT</a:t>
+              <a:t>RSNA </a:t>
             </a:r>
             <a:r>
               <a:rPr lang="he-IL" dirty="0"/>
-              <a:t>- הדאטה נאסף מ65,000 פציינטים. סט משופר מהקודם, בוצעה וריפיקציה של ה</a:t>
-            </a:r>
+              <a:t>– החברה הצפון האמריקאית לרדיולוגיה</a:t>
+            </a:r>
+            <a:endParaRPr lang="en-US" dirty="0"/>
+          </a:p>
+          <a:p>
+            <a:r>
+              <a:rPr lang="he-IL" dirty="0"/>
+              <a:t>הציעו את האתגר לאחר שיצא הדאטה-סט הראשון</a:t>
+            </a:r>
+            <a:endParaRPr lang="en-US" dirty="0"/>
+          </a:p>
+          <a:p>
             <a:r>
               <a:rPr lang="en-US" dirty="0"/>
-              <a:t>LABELS</a:t>
-            </a:r>
-          </a:p>
-          <a:p>
-            <a:r>
-              <a:rPr lang="he-IL" dirty="0"/>
-              <a:t>בולט שלישי- מאחר שקיימת חפיפה בין לייבלים מסויימים, ומסיבות נוספות, המספרים לא מסתדרים כפי שהיינו מצפים</a:t>
-            </a:r>
-          </a:p>
-          <a:p>
-            <a:r>
-              <a:rPr lang="en-US" dirty="0"/>
-              <a:t>September 19</a:t>
+              <a:t>Closed a year ago</a:t>
             </a:r>
             <a:endParaRPr lang="he-IL" dirty="0"/>
           </a:p>
@@ -2660,13 +2931,19 @@
               <a:defRPr/>
             </a:pPr>
             <a:r>
-              <a:rPr lang="he-IL" dirty="0"/>
-              <a:t>הדאטה עבר שיפוץ – גרסה קודמת הכילה 100,000 צילומים ותיוגים לא נכונים</a:t>
-            </a:r>
-            <a:endParaRPr lang="en-US" dirty="0"/>
-          </a:p>
-          <a:p>
-            <a:endParaRPr lang="en-US" dirty="0"/>
+              <a:rPr lang="en-US" dirty="0">
+                <a:solidFill>
+                  <a:srgbClr val="002060"/>
+                </a:solidFill>
+              </a:rPr>
+              <a:t>Best results score 0.25475</a:t>
+            </a:r>
+          </a:p>
+          <a:p>
+            <a:r>
+              <a:rPr lang="en-US" dirty="0"/>
+              <a:t>Average of Intersection over Union in bounding boxes</a:t>
+            </a:r>
           </a:p>
         </p:txBody>
       </p:sp>
@@ -2688,7 +2965,7 @@
             <a:fld id="{C8C92D0D-AF30-4211-86C4-A3B87597F349}" type="slidenum">
               <a:rPr lang="he-IL" smtClean="0"/>
               <a:pPr/>
-              <a:t>8</a:t>
+              <a:t>7</a:t>
             </a:fld>
             <a:endParaRPr lang="he-IL"/>
           </a:p>
@@ -2699,7 +2976,7 @@
           <p:cNvPr id="5" name="Footer Placeholder 4">
             <a:extLst>
               <a:ext uri="{FF2B5EF4-FFF2-40B4-BE49-F238E27FC236}">
-                <a16:creationId xmlns:a16="http://schemas.microsoft.com/office/drawing/2014/main" id="{E019C9B4-BB72-4AD5-BF7A-19B88CABF0C0}"/>
+                <a16:creationId xmlns:a16="http://schemas.microsoft.com/office/drawing/2014/main" id="{F1B846EA-2635-40F4-912F-3C058728FFC0}"/>
               </a:ext>
             </a:extLst>
           </p:cNvPr>
@@ -2725,7 +3002,7 @@
     </p:spTree>
     <p:extLst>
       <p:ext uri="{BB962C8B-B14F-4D97-AF65-F5344CB8AC3E}">
-        <p14:creationId xmlns:p14="http://schemas.microsoft.com/office/powerpoint/2010/main" val="2299966286"/>
+        <p14:creationId xmlns:p14="http://schemas.microsoft.com/office/powerpoint/2010/main" val="223982526"/>
       </p:ext>
     </p:extLst>
   </p:cSld>
@@ -2780,47 +3057,24 @@
           <a:lstStyle/>
           <a:p>
             <a:r>
+              <a:rPr lang="en-US" dirty="0"/>
+              <a:t>CHEXPERT</a:t>
+            </a:r>
+            <a:r>
               <a:rPr lang="he-IL" dirty="0"/>
-              <a:t>דוגמה לעבודה קודמת</a:t>
-            </a:r>
-          </a:p>
-          <a:p>
-            <a:r>
-              <a:rPr lang="he-IL" dirty="0"/>
-              <a:t>לציין שאין התייחסות כלשהי לדפורמציות בתמונות – הבעיה לא קיבלה טיפול</a:t>
-            </a:r>
-            <a:endParaRPr lang="en-US" dirty="0"/>
-          </a:p>
-          <a:p>
-            <a:r>
-              <a:rPr lang="he-IL" dirty="0"/>
-              <a:t>בקצרה: לימוד ראשוני על כל ה</a:t>
+              <a:t>- הדאטה נאסף מ65,000 פציינטים. סט שהוא שיפור של סט קודם של 120,000 צילומים, בוצעה וריפיקציה של ה</a:t>
             </a:r>
             <a:r>
               <a:rPr lang="en-US" dirty="0"/>
-              <a:t>POSITIVES</a:t>
-            </a:r>
-            <a:r>
-              <a:rPr lang="he-IL" dirty="0"/>
-              <a:t> למציאת קשרים בין </a:t>
-            </a:r>
+              <a:t>LABELS</a:t>
+            </a:r>
+          </a:p>
+          <a:p>
             <a:r>
               <a:rPr lang="en-US" dirty="0"/>
-              <a:t>LABEL</a:t>
-            </a:r>
-            <a:r>
-              <a:rPr lang="he-IL" dirty="0"/>
-              <a:t>ים, ואז אימון על כל ה</a:t>
-            </a:r>
-            <a:r>
-              <a:rPr lang="en-US" dirty="0"/>
-              <a:t>DATASET</a:t>
-            </a:r>
-            <a:r>
-              <a:rPr lang="he-IL" dirty="0"/>
-              <a:t> תוך ניצול הקשרים שנלמדו בשלב ראשון</a:t>
-            </a:r>
-            <a:endParaRPr lang="en-US" dirty="0"/>
+              <a:t>September 19</a:t>
+            </a:r>
+            <a:endParaRPr lang="he-IL" dirty="0"/>
           </a:p>
         </p:txBody>
       </p:sp>
@@ -2842,7 +3096,7 @@
             <a:fld id="{C8C92D0D-AF30-4211-86C4-A3B87597F349}" type="slidenum">
               <a:rPr lang="he-IL" smtClean="0"/>
               <a:pPr/>
-              <a:t>9</a:t>
+              <a:t>8</a:t>
             </a:fld>
             <a:endParaRPr lang="he-IL"/>
           </a:p>
@@ -2879,7 +3133,7 @@
     </p:spTree>
     <p:extLst>
       <p:ext uri="{BB962C8B-B14F-4D97-AF65-F5344CB8AC3E}">
-        <p14:creationId xmlns:p14="http://schemas.microsoft.com/office/powerpoint/2010/main" val="2280981912"/>
+        <p14:creationId xmlns:p14="http://schemas.microsoft.com/office/powerpoint/2010/main" val="2299966286"/>
       </p:ext>
     </p:extLst>
   </p:cSld>
@@ -2935,37 +3189,52 @@
           <a:p>
             <a:r>
               <a:rPr lang="he-IL" dirty="0"/>
-              <a:t>להגיד "הנה הצעה להתמודדות עם דפורמציות"</a:t>
+              <a:t>דוגמה לעבודה קודמת</a:t>
+            </a:r>
+          </a:p>
+          <a:p>
+            <a:r>
+              <a:rPr lang="he-IL" dirty="0"/>
+              <a:t>לציין שאין התייחסות כלשהי לדפורמציות בתמונות – הבעיה לא קיבלה טיפול</a:t>
             </a:r>
             <a:endParaRPr lang="en-US" dirty="0"/>
           </a:p>
-        </p:txBody>
-      </p:sp>
-      <p:sp>
-        <p:nvSpPr>
-          <p:cNvPr id="4" name="Footer Placeholder 3"/>
-          <p:cNvSpPr>
-            <a:spLocks noGrp="1"/>
-          </p:cNvSpPr>
-          <p:nvPr>
-            <p:ph type="ftr" sz="quarter" idx="4"/>
-          </p:nvPr>
-        </p:nvSpPr>
-        <p:spPr/>
-        <p:txBody>
-          <a:bodyPr/>
-          <a:lstStyle/>
-          <a:p>
-            <a:r>
-              <a:rPr lang="he-IL"/>
-              <a:t>2</a:t>
-            </a:r>
-          </a:p>
-        </p:txBody>
-      </p:sp>
-      <p:sp>
-        <p:nvSpPr>
-          <p:cNvPr id="5" name="Slide Number Placeholder 4"/>
+          <a:p>
+            <a:r>
+              <a:rPr lang="he-IL" dirty="0"/>
+              <a:t>בקצרה: לימוד ראשוני על כל ה</a:t>
+            </a:r>
+            <a:r>
+              <a:rPr lang="en-US" dirty="0"/>
+              <a:t>POSITIVES</a:t>
+            </a:r>
+            <a:r>
+              <a:rPr lang="he-IL" dirty="0"/>
+              <a:t> למציאת קשרים בין </a:t>
+            </a:r>
+            <a:r>
+              <a:rPr lang="en-US" dirty="0"/>
+              <a:t>LABEL</a:t>
+            </a:r>
+            <a:r>
+              <a:rPr lang="he-IL" dirty="0"/>
+              <a:t>ים, ואז אימון על כל ה</a:t>
+            </a:r>
+            <a:r>
+              <a:rPr lang="en-US" dirty="0"/>
+              <a:t>DATASET</a:t>
+            </a:r>
+            <a:r>
+              <a:rPr lang="he-IL" dirty="0"/>
+              <a:t> תוך ניצול הקשרים שנלמדו בשלב ראשון</a:t>
+            </a:r>
+            <a:endParaRPr lang="en-US" dirty="0"/>
+          </a:p>
+        </p:txBody>
+      </p:sp>
+      <p:sp>
+        <p:nvSpPr>
+          <p:cNvPr id="4" name="Slide Number Placeholder 3"/>
           <p:cNvSpPr>
             <a:spLocks noGrp="1"/>
           </p:cNvSpPr>
@@ -2981,16 +3250,44 @@
             <a:fld id="{C8C92D0D-AF30-4211-86C4-A3B87597F349}" type="slidenum">
               <a:rPr lang="he-IL" smtClean="0"/>
               <a:pPr/>
-              <a:t>10</a:t>
+              <a:t>9</a:t>
             </a:fld>
             <a:endParaRPr lang="he-IL"/>
+          </a:p>
+        </p:txBody>
+      </p:sp>
+      <p:sp>
+        <p:nvSpPr>
+          <p:cNvPr id="5" name="Footer Placeholder 4">
+            <a:extLst>
+              <a:ext uri="{FF2B5EF4-FFF2-40B4-BE49-F238E27FC236}">
+                <a16:creationId xmlns:a16="http://schemas.microsoft.com/office/drawing/2014/main" id="{E019C9B4-BB72-4AD5-BF7A-19B88CABF0C0}"/>
+              </a:ext>
+            </a:extLst>
+          </p:cNvPr>
+          <p:cNvSpPr>
+            <a:spLocks noGrp="1"/>
+          </p:cNvSpPr>
+          <p:nvPr>
+            <p:ph type="ftr" sz="quarter" idx="4"/>
+          </p:nvPr>
+        </p:nvSpPr>
+        <p:spPr/>
+        <p:txBody>
+          <a:bodyPr/>
+          <a:lstStyle/>
+          <a:p>
+            <a:r>
+              <a:rPr lang="he-IL"/>
+              <a:t>2</a:t>
+            </a:r>
           </a:p>
         </p:txBody>
       </p:sp>
     </p:spTree>
     <p:extLst>
       <p:ext uri="{BB962C8B-B14F-4D97-AF65-F5344CB8AC3E}">
-        <p14:creationId xmlns:p14="http://schemas.microsoft.com/office/powerpoint/2010/main" val="1641449463"/>
+        <p14:creationId xmlns:p14="http://schemas.microsoft.com/office/powerpoint/2010/main" val="2280981912"/>
       </p:ext>
     </p:extLst>
   </p:cSld>
@@ -3046,29 +3343,7 @@
           <a:p>
             <a:r>
               <a:rPr lang="he-IL" dirty="0"/>
-              <a:t>יש לציין כאן שהלימוד של ה</a:t>
-            </a:r>
-            <a:r>
-              <a:rPr lang="en-US" dirty="0"/>
-              <a:t>OFFSET</a:t>
-            </a:r>
-            <a:r>
-              <a:rPr lang="he-IL" dirty="0"/>
-              <a:t>ים מתבצע במקביל ללימוד של הרשת, דרך שכבת קונוולוציה רגילה</a:t>
-            </a:r>
-          </a:p>
-          <a:p>
-            <a:r>
-              <a:rPr lang="he-IL" dirty="0"/>
-              <a:t>השכבה הזאת מבצעת </a:t>
-            </a:r>
-            <a:r>
-              <a:rPr lang="en-US" dirty="0"/>
-              <a:t>BACKPROP</a:t>
-            </a:r>
-            <a:r>
-              <a:rPr lang="he-IL" dirty="0"/>
-              <a:t> לרשת ולמעשה מתקיימת במקביל לרשת עצמה</a:t>
+              <a:t>להגיד "הנה הצעה להתמודדות עם דפורמציות"</a:t>
             </a:r>
             <a:endParaRPr lang="en-US" dirty="0"/>
           </a:p>
@@ -3114,7 +3389,7 @@
             <a:fld id="{C8C92D0D-AF30-4211-86C4-A3B87597F349}" type="slidenum">
               <a:rPr lang="he-IL" smtClean="0"/>
               <a:pPr/>
-              <a:t>11</a:t>
+              <a:t>10</a:t>
             </a:fld>
             <a:endParaRPr lang="he-IL"/>
           </a:p>
@@ -3123,7 +3398,7 @@
     </p:spTree>
     <p:extLst>
       <p:ext uri="{BB962C8B-B14F-4D97-AF65-F5344CB8AC3E}">
-        <p14:creationId xmlns:p14="http://schemas.microsoft.com/office/powerpoint/2010/main" val="3015799941"/>
+        <p14:creationId xmlns:p14="http://schemas.microsoft.com/office/powerpoint/2010/main" val="1641449463"/>
       </p:ext>
     </p:extLst>
   </p:cSld>
@@ -3179,7 +3454,29 @@
           <a:p>
             <a:r>
               <a:rPr lang="he-IL" dirty="0"/>
-              <a:t>לציין שמדובר בשיטות סגמנטציה שונות, ולהדגיש שהתרומה לסבוכיות לא הייתה משמעותית</a:t>
+              <a:t>יש לציין כאן שהלימוד של ה</a:t>
+            </a:r>
+            <a:r>
+              <a:rPr lang="en-US" dirty="0"/>
+              <a:t>OFFSET</a:t>
+            </a:r>
+            <a:r>
+              <a:rPr lang="he-IL" dirty="0"/>
+              <a:t>ים מתבצע במקביל ללימוד של הרשת, דרך שכבת קונוולוציה רגילה</a:t>
+            </a:r>
+          </a:p>
+          <a:p>
+            <a:r>
+              <a:rPr lang="he-IL" dirty="0"/>
+              <a:t>השכבה הזאת מבצעת </a:t>
+            </a:r>
+            <a:r>
+              <a:rPr lang="en-US" dirty="0"/>
+              <a:t>BACKPROP</a:t>
+            </a:r>
+            <a:r>
+              <a:rPr lang="he-IL" dirty="0"/>
+              <a:t> לרשת ולמעשה מתקיימת במקביל לרשת עצמה</a:t>
             </a:r>
             <a:endParaRPr lang="en-US" dirty="0"/>
           </a:p>
@@ -3187,7 +3484,29 @@
       </p:sp>
       <p:sp>
         <p:nvSpPr>
-          <p:cNvPr id="4" name="Slide Number Placeholder 3"/>
+          <p:cNvPr id="4" name="Footer Placeholder 3"/>
+          <p:cNvSpPr>
+            <a:spLocks noGrp="1"/>
+          </p:cNvSpPr>
+          <p:nvPr>
+            <p:ph type="ftr" sz="quarter" idx="4"/>
+          </p:nvPr>
+        </p:nvSpPr>
+        <p:spPr/>
+        <p:txBody>
+          <a:bodyPr/>
+          <a:lstStyle/>
+          <a:p>
+            <a:r>
+              <a:rPr lang="he-IL"/>
+              <a:t>2</a:t>
+            </a:r>
+          </a:p>
+        </p:txBody>
+      </p:sp>
+      <p:sp>
+        <p:nvSpPr>
+          <p:cNvPr id="5" name="Slide Number Placeholder 4"/>
           <p:cNvSpPr>
             <a:spLocks noGrp="1"/>
           </p:cNvSpPr>
@@ -3203,44 +3522,16 @@
             <a:fld id="{C8C92D0D-AF30-4211-86C4-A3B87597F349}" type="slidenum">
               <a:rPr lang="he-IL" smtClean="0"/>
               <a:pPr/>
-              <a:t>13</a:t>
+              <a:t>11</a:t>
             </a:fld>
             <a:endParaRPr lang="he-IL"/>
-          </a:p>
-        </p:txBody>
-      </p:sp>
-      <p:sp>
-        <p:nvSpPr>
-          <p:cNvPr id="5" name="Footer Placeholder 4">
-            <a:extLst>
-              <a:ext uri="{FF2B5EF4-FFF2-40B4-BE49-F238E27FC236}">
-                <a16:creationId xmlns:a16="http://schemas.microsoft.com/office/drawing/2014/main" id="{AD753467-F10B-4164-AC16-609227753711}"/>
-              </a:ext>
-            </a:extLst>
-          </p:cNvPr>
-          <p:cNvSpPr>
-            <a:spLocks noGrp="1"/>
-          </p:cNvSpPr>
-          <p:nvPr>
-            <p:ph type="ftr" sz="quarter" idx="4"/>
-          </p:nvPr>
-        </p:nvSpPr>
-        <p:spPr/>
-        <p:txBody>
-          <a:bodyPr/>
-          <a:lstStyle/>
-          <a:p>
-            <a:r>
-              <a:rPr lang="he-IL"/>
-              <a:t>2</a:t>
-            </a:r>
           </a:p>
         </p:txBody>
       </p:sp>
     </p:spTree>
     <p:extLst>
       <p:ext uri="{BB962C8B-B14F-4D97-AF65-F5344CB8AC3E}">
-        <p14:creationId xmlns:p14="http://schemas.microsoft.com/office/powerpoint/2010/main" val="1110135167"/>
+        <p14:creationId xmlns:p14="http://schemas.microsoft.com/office/powerpoint/2010/main" val="3015799941"/>
       </p:ext>
     </p:extLst>
   </p:cSld>
@@ -4046,7 +4337,7 @@
           <a:p>
             <a:fld id="{BFD2984C-9D56-40A8-839A-3AF6619B1C81}" type="datetime1">
               <a:rPr lang="en-US" smtClean="0"/>
-              <a:t>1/7/2020</a:t>
+              <a:t>1/8/2020</a:t>
             </a:fld>
             <a:endParaRPr lang="en-US"/>
           </a:p>
@@ -4293,7 +4584,7 @@
           <a:p>
             <a:fld id="{1408F81D-5BB7-4C4A-AE55-B68165AD758E}" type="datetime1">
               <a:rPr lang="en-US" smtClean="0"/>
-              <a:t>1/7/2020</a:t>
+              <a:t>1/8/2020</a:t>
             </a:fld>
             <a:endParaRPr lang="en-US"/>
           </a:p>
@@ -5658,7 +5949,7 @@
           <p:nvPr/>
         </p:nvPicPr>
         <p:blipFill>
-          <a:blip r:embed="rId2"/>
+          <a:blip r:embed="rId3"/>
           <a:stretch>
             <a:fillRect/>
           </a:stretch>
@@ -6194,7 +6485,7 @@
                   <a:srgbClr val="002060"/>
                 </a:solidFill>
               </a:rPr>
-              <a:t> Runner Up in Segmentation Challenge</a:t>
+              <a:t> runner up in Segmentation Challenge</a:t>
             </a:r>
           </a:p>
         </p:txBody>
@@ -6333,7 +6624,7 @@
                   <a:srgbClr val="002060"/>
                 </a:solidFill>
               </a:rPr>
-              <a:t>DCN V2</a:t>
+              <a:t>DCNv2</a:t>
             </a:r>
             <a:endParaRPr lang="en-US" dirty="0"/>
           </a:p>
@@ -6504,7 +6795,7 @@
                   <a:srgbClr val="002060"/>
                 </a:solidFill>
               </a:rPr>
-              <a:t>DCN V2</a:t>
+              <a:t>DCNv2 – cont.</a:t>
             </a:r>
             <a:endParaRPr lang="en-US" dirty="0"/>
           </a:p>
@@ -6563,20 +6854,6 @@
                 </a:solidFill>
               </a:rPr>
               <a:t>Allows to control sampling over a broader range of feature levels</a:t>
-            </a:r>
-          </a:p>
-          <a:p>
-            <a:pPr lvl="1">
-              <a:buFont typeface="Arial" panose="020B0604020202020204" pitchFamily="34" charset="0"/>
-              <a:buChar char="•"/>
-            </a:pPr>
-            <a:r>
-              <a:rPr lang="en-US" sz="2000" dirty="0">
-                <a:solidFill>
-                  <a:srgbClr val="002060"/>
-                </a:solidFill>
-              </a:rPr>
-              <a:t>Feature mimicking loss - favors learning of features consistent to those of R-CNN</a:t>
             </a:r>
           </a:p>
           <a:p>
@@ -6657,7 +6934,7 @@
         </p:blipFill>
         <p:spPr>
           <a:xfrm>
-            <a:off x="838201" y="4216845"/>
+            <a:off x="667803" y="3713385"/>
             <a:ext cx="3390900" cy="1676400"/>
           </a:xfrm>
           <a:prstGeom prst="rect">
@@ -6687,8 +6964,8 @@
         </p:blipFill>
         <p:spPr>
           <a:xfrm>
-            <a:off x="4767263" y="4551585"/>
-            <a:ext cx="3381375" cy="657225"/>
+            <a:off x="5058718" y="4114800"/>
+            <a:ext cx="3417479" cy="664243"/>
           </a:xfrm>
           <a:prstGeom prst="rect">
             <a:avLst/>
@@ -6709,7 +6986,7 @@
         </p:nvSpPr>
         <p:spPr>
           <a:xfrm>
-            <a:off x="4744226" y="4216598"/>
+            <a:off x="4572000" y="3705225"/>
             <a:ext cx="2987040" cy="307777"/>
           </a:xfrm>
           <a:prstGeom prst="rect">
@@ -6794,7 +7071,7 @@
                   <a:srgbClr val="002060"/>
                 </a:solidFill>
               </a:rPr>
-              <a:t>DCN V2</a:t>
+              <a:t>DCNv2 – cont.</a:t>
             </a:r>
             <a:endParaRPr lang="en-US" dirty="0"/>
           </a:p>
@@ -7034,7 +7311,7 @@
                   <a:srgbClr val="002060"/>
                 </a:solidFill>
               </a:rPr>
-              <a:t>DCN V2</a:t>
+              <a:t>DCNv2 – cont.</a:t>
             </a:r>
             <a:endParaRPr lang="en-US" dirty="0"/>
           </a:p>
@@ -7648,7 +7925,7 @@
                 <a:ea typeface="+mn-ea"/>
                 <a:cs typeface="+mn-cs"/>
               </a:rPr>
-              <a:t>Chosen Solution – example</a:t>
+              <a:t>Chosen Solution – Example</a:t>
             </a:r>
           </a:p>
         </p:txBody>
@@ -9979,7 +10256,7 @@
                   <a:srgbClr val="002060"/>
                 </a:solidFill>
               </a:rPr>
-              <a:t>Develop technique for the detection of Pneumonia in chest X-ray images, which is robust to deformations caused by different body structure or different lying position</a:t>
+              <a:t>Develop technique for the detection of Pneumonia in chest X-ray images, which is robust to deformations caused by different body structure or different laying position</a:t>
             </a:r>
           </a:p>
         </p:txBody>
@@ -10799,7 +11076,7 @@
                   <a:srgbClr val="002060"/>
                 </a:solidFill>
               </a:rPr>
-              <a:t>16,600 are labeled with Pneumonia, 170,000 are labeled Normal </a:t>
+              <a:t>16,600 are labeled with Normal, 170,000 are labeled with various diseases</a:t>
             </a:r>
           </a:p>
           <a:p>
@@ -10813,12 +11090,13 @@
                   <a:srgbClr val="002060"/>
                 </a:solidFill>
               </a:rPr>
-              <a:t>Other diseases also labeled </a:t>
-            </a:r>
-          </a:p>
-          <a:p>
-            <a:pPr marL="0" indent="0">
-              <a:buNone/>
+              <a:t>Out of the unhealthy group, 4500 labeled Pneumonia</a:t>
+            </a:r>
+          </a:p>
+          <a:p>
+            <a:pPr lvl="1">
+              <a:buFont typeface="Arial" panose="020B0604020202020204" pitchFamily="34" charset="0"/>
+              <a:buChar char="•"/>
             </a:pPr>
             <a:endParaRPr lang="en-US" dirty="0">
               <a:solidFill>

</xml_diff>